<commit_message>
Made changes to system overview diagram in PPT
</commit_message>
<xml_diff>
--- a/Review and analysis.pptx
+++ b/Review and analysis.pptx
@@ -227,7 +227,7 @@
           <a:p>
             <a:fld id="{462412A6-D889-854E-ACDD-CE38088E23A3}" type="datetimeFigureOut">
               <a:rPr lang="en-US" smtClean="0"/>
-              <a:t>12/8/2019</a:t>
+              <a:t>12/10/2019</a:t>
             </a:fld>
             <a:endParaRPr lang="en-US"/>
           </a:p>
@@ -11509,7 +11509,7 @@
                 <a:latin typeface="Avenir Next Ultra Light"/>
                 <a:cs typeface="Avenir Next Ultra Light"/>
               </a:rPr>
-              <a:t>12/8/2019</a:t>
+              <a:t>12/10/2019</a:t>
             </a:fld>
             <a:endParaRPr lang="en-US" dirty="0">
               <a:solidFill>
@@ -11652,15 +11652,7 @@
             </a:pPr>
             <a:r>
               <a:rPr lang="en-US" dirty="0"/>
-              <a:t>The </a:t>
-            </a:r>
-            <a:r>
-              <a:rPr lang="en-US" dirty="0" err="1"/>
-              <a:t>good,the</a:t>
-            </a:r>
-            <a:r>
-              <a:rPr lang="en-US" dirty="0"/>
-              <a:t> bad, the OMG!!</a:t>
+              <a:t>The good, the bad, the OMG!!</a:t>
             </a:r>
           </a:p>
         </p:txBody>
@@ -11720,6 +11712,156 @@
       </p:grpSpPr>
       <p:sp>
         <p:nvSpPr>
+          <p:cNvPr id="90" name="Rectangle 89">
+            <a:extLst>
+              <a:ext uri="{FF2B5EF4-FFF2-40B4-BE49-F238E27FC236}">
+                <a16:creationId xmlns:a16="http://schemas.microsoft.com/office/drawing/2014/main" id="{AC240093-BBB8-439E-99BB-58594315CD16}"/>
+              </a:ext>
+            </a:extLst>
+          </p:cNvPr>
+          <p:cNvSpPr/>
+          <p:nvPr/>
+        </p:nvSpPr>
+        <p:spPr>
+          <a:xfrm>
+            <a:off x="4954954" y="711197"/>
+            <a:ext cx="3040183" cy="3454400"/>
+          </a:xfrm>
+          <a:prstGeom prst="rect">
+            <a:avLst/>
+          </a:prstGeom>
+          <a:solidFill>
+            <a:schemeClr val="tx1">
+              <a:lumMod val="85000"/>
+              <a:lumOff val="15000"/>
+            </a:schemeClr>
+          </a:solidFill>
+          <a:ln>
+            <a:solidFill>
+              <a:schemeClr val="bg1"/>
+            </a:solidFill>
+          </a:ln>
+        </p:spPr>
+        <p:style>
+          <a:lnRef idx="2">
+            <a:schemeClr val="accent1">
+              <a:shade val="50000"/>
+            </a:schemeClr>
+          </a:lnRef>
+          <a:fillRef idx="1">
+            <a:schemeClr val="accent1"/>
+          </a:fillRef>
+          <a:effectRef idx="0">
+            <a:schemeClr val="accent1"/>
+          </a:effectRef>
+          <a:fontRef idx="minor">
+            <a:schemeClr val="lt1"/>
+          </a:fontRef>
+        </p:style>
+        <p:txBody>
+          <a:bodyPr rtlCol="0" anchor="ctr"/>
+          <a:lstStyle/>
+          <a:p>
+            <a:pPr algn="ctr"/>
+            <a:endParaRPr lang="en-US"/>
+          </a:p>
+        </p:txBody>
+      </p:sp>
+      <p:sp>
+        <p:nvSpPr>
+          <p:cNvPr id="79" name="Rectangle 78">
+            <a:extLst>
+              <a:ext uri="{FF2B5EF4-FFF2-40B4-BE49-F238E27FC236}">
+                <a16:creationId xmlns:a16="http://schemas.microsoft.com/office/drawing/2014/main" id="{EF0F3235-3AAE-458D-8EC3-938D0A5B42C7}"/>
+              </a:ext>
+            </a:extLst>
+          </p:cNvPr>
+          <p:cNvSpPr/>
+          <p:nvPr/>
+        </p:nvSpPr>
+        <p:spPr>
+          <a:xfrm>
+            <a:off x="2567515" y="910265"/>
+            <a:ext cx="1575513" cy="3092776"/>
+          </a:xfrm>
+          <a:prstGeom prst="rect">
+            <a:avLst/>
+          </a:prstGeom>
+          <a:solidFill>
+            <a:schemeClr val="tx1">
+              <a:lumMod val="85000"/>
+              <a:lumOff val="15000"/>
+            </a:schemeClr>
+          </a:solidFill>
+          <a:ln>
+            <a:solidFill>
+              <a:schemeClr val="bg1"/>
+            </a:solidFill>
+          </a:ln>
+        </p:spPr>
+        <p:style>
+          <a:lnRef idx="2">
+            <a:schemeClr val="accent1">
+              <a:shade val="50000"/>
+            </a:schemeClr>
+          </a:lnRef>
+          <a:fillRef idx="1">
+            <a:schemeClr val="accent1"/>
+          </a:fillRef>
+          <a:effectRef idx="0">
+            <a:schemeClr val="accent1"/>
+          </a:effectRef>
+          <a:fontRef idx="minor">
+            <a:schemeClr val="lt1"/>
+          </a:fontRef>
+        </p:style>
+        <p:txBody>
+          <a:bodyPr rtlCol="0" anchor="ctr"/>
+          <a:lstStyle/>
+          <a:p>
+            <a:pPr algn="ctr"/>
+            <a:endParaRPr lang="en-US"/>
+          </a:p>
+        </p:txBody>
+      </p:sp>
+      <p:pic>
+        <p:nvPicPr>
+          <p:cNvPr id="39" name="Graphic 38" descr="Internet">
+            <a:extLst>
+              <a:ext uri="{FF2B5EF4-FFF2-40B4-BE49-F238E27FC236}">
+                <a16:creationId xmlns:a16="http://schemas.microsoft.com/office/drawing/2014/main" id="{FD72DF9A-9BA1-498A-B68A-68BE3056B101}"/>
+              </a:ext>
+            </a:extLst>
+          </p:cNvPr>
+          <p:cNvPicPr>
+            <a:picLocks noChangeAspect="1"/>
+          </p:cNvPicPr>
+          <p:nvPr/>
+        </p:nvPicPr>
+        <p:blipFill>
+          <a:blip r:embed="rId3">
+            <a:extLst>
+              <a:ext uri="{96DAC541-7B7A-43D3-8B79-37D633B846F1}">
+                <asvg:svgBlip xmlns:asvg="http://schemas.microsoft.com/office/drawing/2016/SVG/main" r:embed="rId4"/>
+              </a:ext>
+            </a:extLst>
+          </a:blip>
+          <a:stretch>
+            <a:fillRect/>
+          </a:stretch>
+        </p:blipFill>
+        <p:spPr>
+          <a:xfrm>
+            <a:off x="2749507" y="793936"/>
+            <a:ext cx="1108723" cy="1108723"/>
+          </a:xfrm>
+          <a:prstGeom prst="rect">
+            <a:avLst/>
+          </a:prstGeom>
+        </p:spPr>
+      </p:pic>
+      <p:sp>
+        <p:nvSpPr>
           <p:cNvPr id="2" name="Title 1"/>
           <p:cNvSpPr>
             <a:spLocks noGrp="1"/>
@@ -11728,7 +11870,12 @@
             <p:ph type="title"/>
           </p:nvPr>
         </p:nvSpPr>
-        <p:spPr/>
+        <p:spPr>
+          <a:xfrm>
+            <a:off x="104426" y="72212"/>
+            <a:ext cx="8338876" cy="662496"/>
+          </a:xfrm>
+        </p:spPr>
         <p:txBody>
           <a:bodyPr/>
           <a:lstStyle/>
@@ -11736,7 +11883,7 @@
             <a:pPr lvl="0"/>
             <a:r>
               <a:rPr lang="en-US" dirty="0"/>
-              <a:t>Proposed System</a:t>
+              <a:t>Review Analyzer System Overview</a:t>
             </a:r>
             <a:endParaRPr lang="en-US" sz="2200" dirty="0"/>
           </a:p>
@@ -11765,343 +11912,254 @@
           </a:p>
         </p:txBody>
       </p:sp>
-      <p:sp>
-        <p:nvSpPr>
-          <p:cNvPr id="5" name="Text Placeholder 1"/>
-          <p:cNvSpPr txBox="1">
-            <a:spLocks/>
-          </p:cNvSpPr>
+      <p:pic>
+        <p:nvPicPr>
+          <p:cNvPr id="16" name="Picture 15" descr="A picture containing drawing&#10;&#10;Description automatically generated">
+            <a:extLst>
+              <a:ext uri="{FF2B5EF4-FFF2-40B4-BE49-F238E27FC236}">
+                <a16:creationId xmlns:a16="http://schemas.microsoft.com/office/drawing/2014/main" id="{B38C0B3F-953A-4D34-A36E-2A999BD758B5}"/>
+              </a:ext>
+            </a:extLst>
+          </p:cNvPr>
+          <p:cNvPicPr>
+            <a:picLocks noChangeAspect="1"/>
+          </p:cNvPicPr>
           <p:nvPr/>
-        </p:nvSpPr>
-        <p:spPr>
-          <a:xfrm>
-            <a:off x="399144" y="1052285"/>
-            <a:ext cx="8453968" cy="3541485"/>
+        </p:nvPicPr>
+        <p:blipFill>
+          <a:blip r:embed="rId5"/>
+          <a:stretch>
+            <a:fillRect/>
+          </a:stretch>
+        </p:blipFill>
+        <p:spPr>
+          <a:xfrm>
+            <a:off x="461307" y="1027276"/>
+            <a:ext cx="515148" cy="424915"/>
           </a:xfrm>
           <a:prstGeom prst="rect">
             <a:avLst/>
           </a:prstGeom>
         </p:spPr>
-        <p:txBody>
-          <a:bodyPr/>
-          <a:lstStyle>
-            <a:lvl1pPr marL="342900" indent="-342900" algn="l" defTabSz="457200" rtl="0" eaLnBrk="1" latinLnBrk="0" hangingPunct="1">
-              <a:spcBef>
-                <a:spcPct val="20000"/>
-              </a:spcBef>
-              <a:buFont typeface="Arial"/>
-              <a:buChar char="•"/>
-              <a:defRPr sz="3200" kern="1200">
-                <a:solidFill>
-                  <a:schemeClr val="tx1"/>
-                </a:solidFill>
-                <a:latin typeface="+mn-lt"/>
-                <a:ea typeface="+mn-ea"/>
-                <a:cs typeface="+mn-cs"/>
-              </a:defRPr>
-            </a:lvl1pPr>
-            <a:lvl2pPr marL="742950" indent="-285750" algn="l" defTabSz="457200" rtl="0" eaLnBrk="1" latinLnBrk="0" hangingPunct="1">
-              <a:spcBef>
-                <a:spcPct val="20000"/>
-              </a:spcBef>
-              <a:buFont typeface="Arial"/>
-              <a:buChar char="–"/>
-              <a:defRPr sz="2800" kern="1200">
-                <a:solidFill>
-                  <a:schemeClr val="tx1"/>
-                </a:solidFill>
-                <a:latin typeface="+mn-lt"/>
-                <a:ea typeface="+mn-ea"/>
-                <a:cs typeface="+mn-cs"/>
-              </a:defRPr>
-            </a:lvl2pPr>
-            <a:lvl3pPr marL="1143000" indent="-228600" algn="l" defTabSz="457200" rtl="0" eaLnBrk="1" latinLnBrk="0" hangingPunct="1">
-              <a:spcBef>
-                <a:spcPct val="20000"/>
-              </a:spcBef>
-              <a:buFont typeface="Arial"/>
-              <a:buChar char="•"/>
-              <a:defRPr sz="2400" kern="1200">
-                <a:solidFill>
-                  <a:schemeClr val="tx1"/>
-                </a:solidFill>
-                <a:latin typeface="+mn-lt"/>
-                <a:ea typeface="+mn-ea"/>
-                <a:cs typeface="+mn-cs"/>
-              </a:defRPr>
-            </a:lvl3pPr>
-            <a:lvl4pPr marL="1600200" indent="-228600" algn="l" defTabSz="457200" rtl="0" eaLnBrk="1" latinLnBrk="0" hangingPunct="1">
-              <a:spcBef>
-                <a:spcPct val="20000"/>
-              </a:spcBef>
-              <a:buFont typeface="Arial"/>
-              <a:buChar char="–"/>
-              <a:defRPr sz="2000" kern="1200">
-                <a:solidFill>
-                  <a:schemeClr val="tx1"/>
-                </a:solidFill>
-                <a:latin typeface="+mn-lt"/>
-                <a:ea typeface="+mn-ea"/>
-                <a:cs typeface="+mn-cs"/>
-              </a:defRPr>
-            </a:lvl4pPr>
-            <a:lvl5pPr marL="2057400" indent="-228600" algn="l" defTabSz="457200" rtl="0" eaLnBrk="1" latinLnBrk="0" hangingPunct="1">
-              <a:spcBef>
-                <a:spcPct val="20000"/>
-              </a:spcBef>
-              <a:buFont typeface="Arial"/>
-              <a:buChar char="»"/>
-              <a:defRPr sz="2000" kern="1200">
-                <a:solidFill>
-                  <a:schemeClr val="tx1"/>
-                </a:solidFill>
-                <a:latin typeface="+mn-lt"/>
-                <a:ea typeface="+mn-ea"/>
-                <a:cs typeface="+mn-cs"/>
-              </a:defRPr>
-            </a:lvl5pPr>
-            <a:lvl6pPr marL="2514600" indent="-228600" algn="l" defTabSz="457200" rtl="0" eaLnBrk="1" latinLnBrk="0" hangingPunct="1">
-              <a:spcBef>
-                <a:spcPct val="20000"/>
-              </a:spcBef>
-              <a:buFont typeface="Arial"/>
-              <a:buChar char="•"/>
-              <a:defRPr sz="2000" kern="1200">
-                <a:solidFill>
-                  <a:schemeClr val="tx1"/>
-                </a:solidFill>
-                <a:latin typeface="+mn-lt"/>
-                <a:ea typeface="+mn-ea"/>
-                <a:cs typeface="+mn-cs"/>
-              </a:defRPr>
-            </a:lvl6pPr>
-            <a:lvl7pPr marL="2971800" indent="-228600" algn="l" defTabSz="457200" rtl="0" eaLnBrk="1" latinLnBrk="0" hangingPunct="1">
-              <a:spcBef>
-                <a:spcPct val="20000"/>
-              </a:spcBef>
-              <a:buFont typeface="Arial"/>
-              <a:buChar char="•"/>
-              <a:defRPr sz="2000" kern="1200">
-                <a:solidFill>
-                  <a:schemeClr val="tx1"/>
-                </a:solidFill>
-                <a:latin typeface="+mn-lt"/>
-                <a:ea typeface="+mn-ea"/>
-                <a:cs typeface="+mn-cs"/>
-              </a:defRPr>
-            </a:lvl7pPr>
-            <a:lvl8pPr marL="3429000" indent="-228600" algn="l" defTabSz="457200" rtl="0" eaLnBrk="1" latinLnBrk="0" hangingPunct="1">
-              <a:spcBef>
-                <a:spcPct val="20000"/>
-              </a:spcBef>
-              <a:buFont typeface="Arial"/>
-              <a:buChar char="•"/>
-              <a:defRPr sz="2000" kern="1200">
-                <a:solidFill>
-                  <a:schemeClr val="tx1"/>
-                </a:solidFill>
-                <a:latin typeface="+mn-lt"/>
-                <a:ea typeface="+mn-ea"/>
-                <a:cs typeface="+mn-cs"/>
-              </a:defRPr>
-            </a:lvl8pPr>
-            <a:lvl9pPr marL="3886200" indent="-228600" algn="l" defTabSz="457200" rtl="0" eaLnBrk="1" latinLnBrk="0" hangingPunct="1">
-              <a:spcBef>
-                <a:spcPct val="20000"/>
-              </a:spcBef>
-              <a:buFont typeface="Arial"/>
-              <a:buChar char="•"/>
-              <a:defRPr sz="2000" kern="1200">
-                <a:solidFill>
-                  <a:schemeClr val="tx1"/>
-                </a:solidFill>
-                <a:latin typeface="+mn-lt"/>
-                <a:ea typeface="+mn-ea"/>
-                <a:cs typeface="+mn-cs"/>
-              </a:defRPr>
-            </a:lvl9pPr>
-          </a:lstStyle>
-          <a:p>
-            <a:pPr marL="0" indent="0">
-              <a:lnSpc>
-                <a:spcPct val="120000"/>
-              </a:lnSpc>
-              <a:buNone/>
-            </a:pPr>
-            <a:endParaRPr lang="en-US" sz="1500" b="1" dirty="0">
-              <a:solidFill>
-                <a:srgbClr val="FFFFFF"/>
-              </a:solidFill>
-              <a:latin typeface="Avenir Next Regular"/>
-              <a:cs typeface="Avenir Next Regular"/>
-            </a:endParaRPr>
-          </a:p>
-        </p:txBody>
-      </p:sp>
-      <p:sp>
-        <p:nvSpPr>
-          <p:cNvPr id="7" name="Rectangle: Rounded Corners 6">
+      </p:pic>
+      <p:pic>
+        <p:nvPicPr>
+          <p:cNvPr id="18" name="Picture 17" descr="A close up of a logo&#10;&#10;Description automatically generated">
             <a:extLst>
               <a:ext uri="{FF2B5EF4-FFF2-40B4-BE49-F238E27FC236}">
-                <a16:creationId xmlns:a16="http://schemas.microsoft.com/office/drawing/2014/main" id="{D33CA516-25DD-4B13-A119-601410E798CF}"/>
+                <a16:creationId xmlns:a16="http://schemas.microsoft.com/office/drawing/2014/main" id="{00E6C020-643F-45DB-AC92-DE76F94732EA}"/>
               </a:ext>
             </a:extLst>
           </p:cNvPr>
-          <p:cNvSpPr/>
+          <p:cNvPicPr>
+            <a:picLocks noChangeAspect="1"/>
+          </p:cNvPicPr>
           <p:nvPr/>
-        </p:nvSpPr>
-        <p:spPr>
-          <a:xfrm>
-            <a:off x="4913153" y="3755846"/>
-            <a:ext cx="1535845" cy="1011417"/>
-          </a:xfrm>
-          <a:prstGeom prst="roundRect">
+        </p:nvPicPr>
+        <p:blipFill>
+          <a:blip r:embed="rId6"/>
+          <a:stretch>
+            <a:fillRect/>
+          </a:stretch>
+        </p:blipFill>
+        <p:spPr>
+          <a:xfrm>
+            <a:off x="463916" y="1554389"/>
+            <a:ext cx="507873" cy="490627"/>
+          </a:xfrm>
+          <a:prstGeom prst="rect">
             <a:avLst/>
           </a:prstGeom>
         </p:spPr>
-        <p:style>
-          <a:lnRef idx="2">
-            <a:schemeClr val="accent6"/>
-          </a:lnRef>
-          <a:fillRef idx="1">
-            <a:schemeClr val="lt1"/>
-          </a:fillRef>
-          <a:effectRef idx="0">
-            <a:schemeClr val="accent6"/>
-          </a:effectRef>
-          <a:fontRef idx="minor">
-            <a:schemeClr val="dk1"/>
-          </a:fontRef>
-        </p:style>
-        <p:txBody>
-          <a:bodyPr rtlCol="0" anchor="ctr"/>
-          <a:lstStyle/>
-          <a:p>
-            <a:pPr algn="ctr"/>
-            <a:r>
-              <a:rPr lang="en-US" dirty="0"/>
-              <a:t>Sentiment in graphical representation</a:t>
-            </a:r>
-          </a:p>
-        </p:txBody>
-      </p:sp>
-      <p:sp>
-        <p:nvSpPr>
-          <p:cNvPr id="8" name="Rectangle: Rounded Corners 7">
+      </p:pic>
+      <p:pic>
+        <p:nvPicPr>
+          <p:cNvPr id="20" name="Picture 19" descr="A picture containing drawing&#10;&#10;Description automatically generated">
             <a:extLst>
               <a:ext uri="{FF2B5EF4-FFF2-40B4-BE49-F238E27FC236}">
-                <a16:creationId xmlns:a16="http://schemas.microsoft.com/office/drawing/2014/main" id="{169299DC-C3D1-4CAA-910B-926F0943DF20}"/>
+                <a16:creationId xmlns:a16="http://schemas.microsoft.com/office/drawing/2014/main" id="{8396202F-3426-4D52-94BC-86AF3A93D610}"/>
               </a:ext>
             </a:extLst>
           </p:cNvPr>
-          <p:cNvSpPr/>
+          <p:cNvPicPr>
+            <a:picLocks noChangeAspect="1"/>
+          </p:cNvPicPr>
           <p:nvPr/>
-        </p:nvSpPr>
-        <p:spPr>
-          <a:xfrm>
-            <a:off x="2384587" y="2312971"/>
-            <a:ext cx="1535845" cy="898358"/>
-          </a:xfrm>
-          <a:prstGeom prst="roundRect">
+        </p:nvPicPr>
+        <p:blipFill>
+          <a:blip r:embed="rId7"/>
+          <a:stretch>
+            <a:fillRect/>
+          </a:stretch>
+        </p:blipFill>
+        <p:spPr>
+          <a:xfrm>
+            <a:off x="456667" y="2796232"/>
+            <a:ext cx="530218" cy="496719"/>
+          </a:xfrm>
+          <a:prstGeom prst="rect">
             <a:avLst/>
           </a:prstGeom>
         </p:spPr>
-        <p:style>
-          <a:lnRef idx="2">
-            <a:schemeClr val="accent6"/>
-          </a:lnRef>
-          <a:fillRef idx="1">
-            <a:schemeClr val="lt1"/>
-          </a:fillRef>
-          <a:effectRef idx="0">
-            <a:schemeClr val="accent6"/>
-          </a:effectRef>
-          <a:fontRef idx="minor">
-            <a:schemeClr val="dk1"/>
-          </a:fontRef>
-        </p:style>
-        <p:txBody>
-          <a:bodyPr rtlCol="0" anchor="ctr"/>
-          <a:lstStyle/>
-          <a:p>
-            <a:pPr algn="ctr"/>
-            <a:r>
-              <a:rPr lang="en-US" dirty="0"/>
-              <a:t>WebApp</a:t>
-            </a:r>
-          </a:p>
-        </p:txBody>
-      </p:sp>
-      <p:sp>
-        <p:nvSpPr>
-          <p:cNvPr id="9" name="Rectangle: Rounded Corners 8">
+      </p:pic>
+      <p:pic>
+        <p:nvPicPr>
+          <p:cNvPr id="22" name="Picture 21" descr="A close up of a logo&#10;&#10;Description automatically generated">
             <a:extLst>
               <a:ext uri="{FF2B5EF4-FFF2-40B4-BE49-F238E27FC236}">
-                <a16:creationId xmlns:a16="http://schemas.microsoft.com/office/drawing/2014/main" id="{FB4C3C3B-3091-4ADE-AEBE-D0B5DED4A967}"/>
+                <a16:creationId xmlns:a16="http://schemas.microsoft.com/office/drawing/2014/main" id="{29CA1C31-933A-4AD3-9233-099F9F55383B}"/>
               </a:ext>
             </a:extLst>
           </p:cNvPr>
-          <p:cNvSpPr/>
+          <p:cNvPicPr>
+            <a:picLocks noChangeAspect="1"/>
+          </p:cNvPicPr>
           <p:nvPr/>
-        </p:nvSpPr>
-        <p:spPr>
-          <a:xfrm>
-            <a:off x="4913153" y="2335534"/>
-            <a:ext cx="1535845" cy="898358"/>
-          </a:xfrm>
-          <a:prstGeom prst="roundRect">
+        </p:nvPicPr>
+        <p:blipFill>
+          <a:blip r:embed="rId8"/>
+          <a:stretch>
+            <a:fillRect/>
+          </a:stretch>
+        </p:blipFill>
+        <p:spPr>
+          <a:xfrm>
+            <a:off x="456667" y="3440672"/>
+            <a:ext cx="530218" cy="509666"/>
+          </a:xfrm>
+          <a:prstGeom prst="rect">
             <a:avLst/>
           </a:prstGeom>
         </p:spPr>
-        <p:style>
-          <a:lnRef idx="2">
-            <a:schemeClr val="accent6"/>
-          </a:lnRef>
-          <a:fillRef idx="1">
-            <a:schemeClr val="lt1"/>
-          </a:fillRef>
-          <a:effectRef idx="0">
-            <a:schemeClr val="accent6"/>
-          </a:effectRef>
-          <a:fontRef idx="minor">
-            <a:schemeClr val="dk1"/>
-          </a:fontRef>
-        </p:style>
-        <p:txBody>
-          <a:bodyPr rtlCol="0" anchor="ctr"/>
-          <a:lstStyle/>
-          <a:p>
-            <a:pPr algn="ctr"/>
-            <a:r>
-              <a:rPr lang="en-US" dirty="0"/>
-              <a:t>Sentiment Analyzer - API</a:t>
-            </a:r>
-          </a:p>
-        </p:txBody>
-      </p:sp>
+      </p:pic>
+      <p:pic>
+        <p:nvPicPr>
+          <p:cNvPr id="24" name="Picture 23" descr="A close up of a logo&#10;&#10;Description automatically generated">
+            <a:extLst>
+              <a:ext uri="{FF2B5EF4-FFF2-40B4-BE49-F238E27FC236}">
+                <a16:creationId xmlns:a16="http://schemas.microsoft.com/office/drawing/2014/main" id="{88E19EDC-6473-4157-934F-782DF5C167C9}"/>
+              </a:ext>
+            </a:extLst>
+          </p:cNvPr>
+          <p:cNvPicPr>
+            <a:picLocks noChangeAspect="1"/>
+          </p:cNvPicPr>
+          <p:nvPr/>
+        </p:nvPicPr>
+        <p:blipFill>
+          <a:blip r:embed="rId9"/>
+          <a:stretch>
+            <a:fillRect/>
+          </a:stretch>
+        </p:blipFill>
+        <p:spPr>
+          <a:xfrm>
+            <a:off x="456667" y="2149265"/>
+            <a:ext cx="513263" cy="501417"/>
+          </a:xfrm>
+          <a:prstGeom prst="rect">
+            <a:avLst/>
+          </a:prstGeom>
+        </p:spPr>
+      </p:pic>
+      <p:pic>
+        <p:nvPicPr>
+          <p:cNvPr id="19" name="Graphic 18" descr="Head with gears">
+            <a:extLst>
+              <a:ext uri="{FF2B5EF4-FFF2-40B4-BE49-F238E27FC236}">
+                <a16:creationId xmlns:a16="http://schemas.microsoft.com/office/drawing/2014/main" id="{B36CC12B-72A1-41A1-ADF6-E383F26BE094}"/>
+              </a:ext>
+            </a:extLst>
+          </p:cNvPr>
+          <p:cNvPicPr>
+            <a:picLocks noChangeAspect="1"/>
+          </p:cNvPicPr>
+          <p:nvPr/>
+        </p:nvPicPr>
+        <p:blipFill>
+          <a:blip r:embed="rId10">
+            <a:extLst>
+              <a:ext uri="{96DAC541-7B7A-43D3-8B79-37D633B846F1}">
+                <asvg:svgBlip xmlns:asvg="http://schemas.microsoft.com/office/drawing/2016/SVG/main" r:embed="rId11"/>
+              </a:ext>
+            </a:extLst>
+          </a:blip>
+          <a:stretch>
+            <a:fillRect/>
+          </a:stretch>
+        </p:blipFill>
+        <p:spPr>
+          <a:xfrm>
+            <a:off x="5176681" y="1254171"/>
+            <a:ext cx="1001883" cy="1001883"/>
+          </a:xfrm>
+          <a:prstGeom prst="rect">
+            <a:avLst/>
+          </a:prstGeom>
+        </p:spPr>
+      </p:pic>
+      <p:pic>
+        <p:nvPicPr>
+          <p:cNvPr id="23" name="Graphic 22" descr="Document">
+            <a:extLst>
+              <a:ext uri="{FF2B5EF4-FFF2-40B4-BE49-F238E27FC236}">
+                <a16:creationId xmlns:a16="http://schemas.microsoft.com/office/drawing/2014/main" id="{24A4227E-7B4C-4705-8A48-552C57E77649}"/>
+              </a:ext>
+            </a:extLst>
+          </p:cNvPr>
+          <p:cNvPicPr>
+            <a:picLocks noChangeAspect="1"/>
+          </p:cNvPicPr>
+          <p:nvPr/>
+        </p:nvPicPr>
+        <p:blipFill>
+          <a:blip r:embed="rId12">
+            <a:extLst>
+              <a:ext uri="{96DAC541-7B7A-43D3-8B79-37D633B846F1}">
+                <asvg:svgBlip xmlns:asvg="http://schemas.microsoft.com/office/drawing/2016/SVG/main" r:embed="rId13"/>
+              </a:ext>
+            </a:extLst>
+          </a:blip>
+          <a:stretch>
+            <a:fillRect/>
+          </a:stretch>
+        </p:blipFill>
+        <p:spPr>
+          <a:xfrm>
+            <a:off x="6869661" y="1308467"/>
+            <a:ext cx="914400" cy="914400"/>
+          </a:xfrm>
+          <a:prstGeom prst="rect">
+            <a:avLst/>
+          </a:prstGeom>
+        </p:spPr>
+      </p:pic>
       <p:cxnSp>
         <p:nvCxnSpPr>
-          <p:cNvPr id="10" name="Straight Connector 9">
+          <p:cNvPr id="31" name="Straight Arrow Connector 30">
             <a:extLst>
               <a:ext uri="{FF2B5EF4-FFF2-40B4-BE49-F238E27FC236}">
-                <a16:creationId xmlns:a16="http://schemas.microsoft.com/office/drawing/2014/main" id="{1B3A5CD7-DED2-4115-999A-450B0D159683}"/>
+                <a16:creationId xmlns:a16="http://schemas.microsoft.com/office/drawing/2014/main" id="{9DD1C443-68D7-4FFE-BBD1-9CCB89EE78C8}"/>
               </a:ext>
             </a:extLst>
           </p:cNvPr>
           <p:cNvCxnSpPr>
-            <a:cxnSpLocks/>
-            <a:endCxn id="8" idx="1"/>
+            <a:stCxn id="23" idx="1"/>
+            <a:endCxn id="19" idx="3"/>
           </p:cNvCxnSpPr>
           <p:nvPr/>
         </p:nvCxnSpPr>
         <p:spPr>
-          <a:xfrm>
-            <a:off x="787518" y="1194037"/>
-            <a:ext cx="1597069" cy="1568113"/>
-          </a:xfrm>
-          <a:prstGeom prst="line">
+          <a:xfrm flipH="1" flipV="1">
+            <a:off x="6178564" y="1755113"/>
+            <a:ext cx="691097" cy="10554"/>
+          </a:xfrm>
+          <a:prstGeom prst="straightConnector1">
             <a:avLst/>
           </a:prstGeom>
+          <a:ln>
+            <a:tailEnd type="triangle"/>
+          </a:ln>
         </p:spPr>
         <p:style>
           <a:lnRef idx="1">
@@ -12120,27 +12178,153 @@
       </p:cxnSp>
       <p:cxnSp>
         <p:nvCxnSpPr>
-          <p:cNvPr id="11" name="Straight Connector 10">
+          <p:cNvPr id="34" name="Straight Arrow Connector 33">
             <a:extLst>
               <a:ext uri="{FF2B5EF4-FFF2-40B4-BE49-F238E27FC236}">
-                <a16:creationId xmlns:a16="http://schemas.microsoft.com/office/drawing/2014/main" id="{D886E685-9B37-451E-A01B-EE2DD4072EF4}"/>
+                <a16:creationId xmlns:a16="http://schemas.microsoft.com/office/drawing/2014/main" id="{D18B03D4-932A-47AB-A923-49F20B96C72B}"/>
               </a:ext>
             </a:extLst>
           </p:cNvPr>
           <p:cNvCxnSpPr>
             <a:cxnSpLocks/>
-            <a:stCxn id="8" idx="3"/>
+            <a:stCxn id="19" idx="2"/>
+            <a:endCxn id="72" idx="0"/>
           </p:cNvCxnSpPr>
           <p:nvPr/>
         </p:nvCxnSpPr>
         <p:spPr>
-          <a:xfrm flipV="1">
-            <a:off x="3920432" y="2758126"/>
-            <a:ext cx="992721" cy="4024"/>
-          </a:xfrm>
-          <a:prstGeom prst="line">
+          <a:xfrm flipH="1">
+            <a:off x="5677622" y="2256054"/>
+            <a:ext cx="1" cy="438415"/>
+          </a:xfrm>
+          <a:prstGeom prst="straightConnector1">
             <a:avLst/>
           </a:prstGeom>
+          <a:ln>
+            <a:headEnd type="triangle"/>
+            <a:tailEnd type="triangle"/>
+          </a:ln>
+        </p:spPr>
+        <p:style>
+          <a:lnRef idx="1">
+            <a:schemeClr val="accent1"/>
+          </a:lnRef>
+          <a:fillRef idx="0">
+            <a:schemeClr val="accent1"/>
+          </a:fillRef>
+          <a:effectRef idx="0">
+            <a:schemeClr val="accent1"/>
+          </a:effectRef>
+          <a:fontRef idx="minor">
+            <a:schemeClr val="tx1"/>
+          </a:fontRef>
+        </p:style>
+      </p:cxnSp>
+      <p:sp>
+        <p:nvSpPr>
+          <p:cNvPr id="35" name="TextBox 34">
+            <a:extLst>
+              <a:ext uri="{FF2B5EF4-FFF2-40B4-BE49-F238E27FC236}">
+                <a16:creationId xmlns:a16="http://schemas.microsoft.com/office/drawing/2014/main" id="{F5D23B81-FB5D-4427-B768-1242F0EDF974}"/>
+              </a:ext>
+            </a:extLst>
+          </p:cNvPr>
+          <p:cNvSpPr txBox="1"/>
+          <p:nvPr/>
+        </p:nvSpPr>
+        <p:spPr>
+          <a:xfrm>
+            <a:off x="5023554" y="690106"/>
+            <a:ext cx="2971583" cy="553998"/>
+          </a:xfrm>
+          <a:prstGeom prst="rect">
+            <a:avLst/>
+          </a:prstGeom>
+          <a:noFill/>
+        </p:spPr>
+        <p:txBody>
+          <a:bodyPr wrap="square" rtlCol="0">
+            <a:spAutoFit/>
+          </a:bodyPr>
+          <a:lstStyle/>
+          <a:p>
+            <a:r>
+              <a:rPr lang="en-US" sz="1000" dirty="0">
+                <a:solidFill>
+                  <a:schemeClr val="bg1"/>
+                </a:solidFill>
+              </a:rPr>
+              <a:t>Supervised learning model using classification ML technique to classify between positive and negative comments</a:t>
+            </a:r>
+          </a:p>
+        </p:txBody>
+      </p:sp>
+      <p:sp>
+        <p:nvSpPr>
+          <p:cNvPr id="38" name="TextBox 37">
+            <a:extLst>
+              <a:ext uri="{FF2B5EF4-FFF2-40B4-BE49-F238E27FC236}">
+                <a16:creationId xmlns:a16="http://schemas.microsoft.com/office/drawing/2014/main" id="{E3A2912B-9B88-486E-8B1B-CF7382E14368}"/>
+              </a:ext>
+            </a:extLst>
+          </p:cNvPr>
+          <p:cNvSpPr txBox="1"/>
+          <p:nvPr/>
+        </p:nvSpPr>
+        <p:spPr>
+          <a:xfrm>
+            <a:off x="6904087" y="2140638"/>
+            <a:ext cx="1006398" cy="246221"/>
+          </a:xfrm>
+          <a:prstGeom prst="rect">
+            <a:avLst/>
+          </a:prstGeom>
+          <a:noFill/>
+        </p:spPr>
+        <p:txBody>
+          <a:bodyPr wrap="square" rtlCol="0">
+            <a:spAutoFit/>
+          </a:bodyPr>
+          <a:lstStyle/>
+          <a:p>
+            <a:r>
+              <a:rPr lang="en-US" sz="1000" dirty="0">
+                <a:solidFill>
+                  <a:schemeClr val="bg1"/>
+                </a:solidFill>
+              </a:rPr>
+              <a:t>Training Data</a:t>
+            </a:r>
+          </a:p>
+        </p:txBody>
+      </p:sp>
+      <p:cxnSp>
+        <p:nvCxnSpPr>
+          <p:cNvPr id="45" name="Straight Arrow Connector 44">
+            <a:extLst>
+              <a:ext uri="{FF2B5EF4-FFF2-40B4-BE49-F238E27FC236}">
+                <a16:creationId xmlns:a16="http://schemas.microsoft.com/office/drawing/2014/main" id="{58D713CF-804E-431C-A5BA-8D98036BEDFD}"/>
+              </a:ext>
+            </a:extLst>
+          </p:cNvPr>
+          <p:cNvCxnSpPr>
+            <a:cxnSpLocks/>
+            <a:stCxn id="16" idx="3"/>
+            <a:endCxn id="79" idx="1"/>
+          </p:cNvCxnSpPr>
+          <p:nvPr/>
+        </p:nvCxnSpPr>
+        <p:spPr>
+          <a:xfrm>
+            <a:off x="976455" y="1239734"/>
+            <a:ext cx="1591060" cy="1216919"/>
+          </a:xfrm>
+          <a:prstGeom prst="straightConnector1">
+            <a:avLst/>
+          </a:prstGeom>
+          <a:ln>
+            <a:tailEnd type="triangle"/>
+          </a:ln>
         </p:spPr>
         <p:style>
           <a:lnRef idx="1">
@@ -12159,218 +12343,31 @@
       </p:cxnSp>
       <p:cxnSp>
         <p:nvCxnSpPr>
-          <p:cNvPr id="12" name="Straight Connector 11">
+          <p:cNvPr id="47" name="Straight Arrow Connector 46">
             <a:extLst>
               <a:ext uri="{FF2B5EF4-FFF2-40B4-BE49-F238E27FC236}">
-                <a16:creationId xmlns:a16="http://schemas.microsoft.com/office/drawing/2014/main" id="{F8B17EBD-A4E7-4BCA-B3D4-C716657D4CE6}"/>
-              </a:ext>
-            </a:extLst>
-          </p:cNvPr>
-          <p:cNvCxnSpPr>
-            <a:cxnSpLocks/>
-            <a:stCxn id="9" idx="2"/>
-            <a:endCxn id="7" idx="0"/>
-          </p:cNvCxnSpPr>
-          <p:nvPr/>
-        </p:nvCxnSpPr>
-        <p:spPr>
-          <a:xfrm>
-            <a:off x="5681076" y="3233892"/>
-            <a:ext cx="0" cy="521954"/>
-          </a:xfrm>
-          <a:prstGeom prst="line">
-            <a:avLst/>
-          </a:prstGeom>
-        </p:spPr>
-        <p:style>
-          <a:lnRef idx="1">
-            <a:schemeClr val="accent1"/>
-          </a:lnRef>
-          <a:fillRef idx="0">
-            <a:schemeClr val="accent1"/>
-          </a:fillRef>
-          <a:effectRef idx="0">
-            <a:schemeClr val="accent1"/>
-          </a:effectRef>
-          <a:fontRef idx="minor">
-            <a:schemeClr val="tx1"/>
-          </a:fontRef>
-        </p:style>
-      </p:cxnSp>
-      <p:pic>
-        <p:nvPicPr>
-          <p:cNvPr id="16" name="Picture 15" descr="A picture containing drawing&#10;&#10;Description automatically generated">
-            <a:extLst>
-              <a:ext uri="{FF2B5EF4-FFF2-40B4-BE49-F238E27FC236}">
-                <a16:creationId xmlns:a16="http://schemas.microsoft.com/office/drawing/2014/main" id="{B38C0B3F-953A-4D34-A36E-2A999BD758B5}"/>
-              </a:ext>
-            </a:extLst>
-          </p:cNvPr>
-          <p:cNvPicPr>
-            <a:picLocks noChangeAspect="1"/>
-          </p:cNvPicPr>
-          <p:nvPr/>
-        </p:nvPicPr>
-        <p:blipFill>
-          <a:blip r:embed="rId3"/>
-          <a:stretch>
-            <a:fillRect/>
-          </a:stretch>
-        </p:blipFill>
-        <p:spPr>
-          <a:xfrm>
-            <a:off x="117446" y="878791"/>
-            <a:ext cx="692877" cy="571513"/>
-          </a:xfrm>
-          <a:prstGeom prst="rect">
-            <a:avLst/>
-          </a:prstGeom>
-        </p:spPr>
-      </p:pic>
-      <p:pic>
-        <p:nvPicPr>
-          <p:cNvPr id="18" name="Picture 17" descr="A close up of a logo&#10;&#10;Description automatically generated">
-            <a:extLst>
-              <a:ext uri="{FF2B5EF4-FFF2-40B4-BE49-F238E27FC236}">
-                <a16:creationId xmlns:a16="http://schemas.microsoft.com/office/drawing/2014/main" id="{00E6C020-643F-45DB-AC92-DE76F94732EA}"/>
-              </a:ext>
-            </a:extLst>
-          </p:cNvPr>
-          <p:cNvPicPr>
-            <a:picLocks noChangeAspect="1"/>
-          </p:cNvPicPr>
-          <p:nvPr/>
-        </p:nvPicPr>
-        <p:blipFill>
-          <a:blip r:embed="rId4"/>
-          <a:stretch>
-            <a:fillRect/>
-          </a:stretch>
-        </p:blipFill>
-        <p:spPr>
-          <a:xfrm>
-            <a:off x="104426" y="1554389"/>
-            <a:ext cx="683092" cy="659896"/>
-          </a:xfrm>
-          <a:prstGeom prst="rect">
-            <a:avLst/>
-          </a:prstGeom>
-        </p:spPr>
-      </p:pic>
-      <p:pic>
-        <p:nvPicPr>
-          <p:cNvPr id="20" name="Picture 19" descr="A picture containing drawing&#10;&#10;Description automatically generated">
-            <a:extLst>
-              <a:ext uri="{FF2B5EF4-FFF2-40B4-BE49-F238E27FC236}">
-                <a16:creationId xmlns:a16="http://schemas.microsoft.com/office/drawing/2014/main" id="{8396202F-3426-4D52-94BC-86AF3A93D610}"/>
-              </a:ext>
-            </a:extLst>
-          </p:cNvPr>
-          <p:cNvPicPr>
-            <a:picLocks noChangeAspect="1"/>
-          </p:cNvPicPr>
-          <p:nvPr/>
-        </p:nvPicPr>
-        <p:blipFill>
-          <a:blip r:embed="rId5"/>
-          <a:stretch>
-            <a:fillRect/>
-          </a:stretch>
-        </p:blipFill>
-        <p:spPr>
-          <a:xfrm>
-            <a:off x="97177" y="3233892"/>
-            <a:ext cx="713146" cy="668089"/>
-          </a:xfrm>
-          <a:prstGeom prst="rect">
-            <a:avLst/>
-          </a:prstGeom>
-        </p:spPr>
-      </p:pic>
-      <p:pic>
-        <p:nvPicPr>
-          <p:cNvPr id="22" name="Picture 21" descr="A close up of a logo&#10;&#10;Description automatically generated">
-            <a:extLst>
-              <a:ext uri="{FF2B5EF4-FFF2-40B4-BE49-F238E27FC236}">
-                <a16:creationId xmlns:a16="http://schemas.microsoft.com/office/drawing/2014/main" id="{29CA1C31-933A-4AD3-9233-099F9F55383B}"/>
-              </a:ext>
-            </a:extLst>
-          </p:cNvPr>
-          <p:cNvPicPr>
-            <a:picLocks noChangeAspect="1"/>
-          </p:cNvPicPr>
-          <p:nvPr/>
-        </p:nvPicPr>
-        <p:blipFill>
-          <a:blip r:embed="rId6"/>
-          <a:stretch>
-            <a:fillRect/>
-          </a:stretch>
-        </p:blipFill>
-        <p:spPr>
-          <a:xfrm>
-            <a:off x="97177" y="3995554"/>
-            <a:ext cx="713146" cy="685503"/>
-          </a:xfrm>
-          <a:prstGeom prst="rect">
-            <a:avLst/>
-          </a:prstGeom>
-        </p:spPr>
-      </p:pic>
-      <p:pic>
-        <p:nvPicPr>
-          <p:cNvPr id="24" name="Picture 23" descr="A close up of a logo&#10;&#10;Description automatically generated">
-            <a:extLst>
-              <a:ext uri="{FF2B5EF4-FFF2-40B4-BE49-F238E27FC236}">
-                <a16:creationId xmlns:a16="http://schemas.microsoft.com/office/drawing/2014/main" id="{88E19EDC-6473-4157-934F-782DF5C167C9}"/>
-              </a:ext>
-            </a:extLst>
-          </p:cNvPr>
-          <p:cNvPicPr>
-            <a:picLocks noChangeAspect="1"/>
-          </p:cNvPicPr>
-          <p:nvPr/>
-        </p:nvPicPr>
-        <p:blipFill>
-          <a:blip r:embed="rId7"/>
-          <a:stretch>
-            <a:fillRect/>
-          </a:stretch>
-        </p:blipFill>
-        <p:spPr>
-          <a:xfrm>
-            <a:off x="97177" y="2313380"/>
-            <a:ext cx="690341" cy="816427"/>
-          </a:xfrm>
-          <a:prstGeom prst="rect">
-            <a:avLst/>
-          </a:prstGeom>
-        </p:spPr>
-      </p:pic>
-      <p:cxnSp>
-        <p:nvCxnSpPr>
-          <p:cNvPr id="25" name="Straight Connector 24">
-            <a:extLst>
-              <a:ext uri="{FF2B5EF4-FFF2-40B4-BE49-F238E27FC236}">
-                <a16:creationId xmlns:a16="http://schemas.microsoft.com/office/drawing/2014/main" id="{617830BD-EEA4-41BF-B10F-FFE4E987DD3D}"/>
+                <a16:creationId xmlns:a16="http://schemas.microsoft.com/office/drawing/2014/main" id="{0D2EB989-21A3-4090-8B8F-ED9C3EB5A727}"/>
               </a:ext>
             </a:extLst>
           </p:cNvPr>
           <p:cNvCxnSpPr>
             <a:cxnSpLocks/>
             <a:stCxn id="18" idx="3"/>
-            <a:endCxn id="8" idx="1"/>
+            <a:endCxn id="79" idx="1"/>
           </p:cNvCxnSpPr>
           <p:nvPr/>
         </p:nvCxnSpPr>
         <p:spPr>
           <a:xfrm>
-            <a:off x="787518" y="1884337"/>
-            <a:ext cx="1597069" cy="877813"/>
-          </a:xfrm>
-          <a:prstGeom prst="line">
+            <a:off x="971789" y="1799703"/>
+            <a:ext cx="1595726" cy="656950"/>
+          </a:xfrm>
+          <a:prstGeom prst="straightConnector1">
             <a:avLst/>
           </a:prstGeom>
+          <a:ln>
+            <a:tailEnd type="triangle"/>
+          </a:ln>
         </p:spPr>
         <p:style>
           <a:lnRef idx="1">
@@ -12389,27 +12386,31 @@
       </p:cxnSp>
       <p:cxnSp>
         <p:nvCxnSpPr>
-          <p:cNvPr id="26" name="Straight Connector 25">
+          <p:cNvPr id="50" name="Straight Arrow Connector 49">
             <a:extLst>
               <a:ext uri="{FF2B5EF4-FFF2-40B4-BE49-F238E27FC236}">
-                <a16:creationId xmlns:a16="http://schemas.microsoft.com/office/drawing/2014/main" id="{4E316C2D-1041-4135-AF22-9742B02A2CAD}"/>
+                <a16:creationId xmlns:a16="http://schemas.microsoft.com/office/drawing/2014/main" id="{85640484-8BC5-43CC-8579-2B5BC9158C0C}"/>
               </a:ext>
             </a:extLst>
           </p:cNvPr>
           <p:cNvCxnSpPr>
             <a:cxnSpLocks/>
-            <a:endCxn id="8" idx="1"/>
+            <a:stCxn id="24" idx="3"/>
+            <a:endCxn id="79" idx="1"/>
           </p:cNvCxnSpPr>
           <p:nvPr/>
         </p:nvCxnSpPr>
         <p:spPr>
-          <a:xfrm flipV="1">
-            <a:off x="810323" y="2762150"/>
-            <a:ext cx="1574264" cy="96"/>
-          </a:xfrm>
-          <a:prstGeom prst="line">
+          <a:xfrm>
+            <a:off x="969930" y="2399974"/>
+            <a:ext cx="1597585" cy="56679"/>
+          </a:xfrm>
+          <a:prstGeom prst="straightConnector1">
             <a:avLst/>
           </a:prstGeom>
+          <a:ln>
+            <a:tailEnd type="triangle"/>
+          </a:ln>
         </p:spPr>
         <p:style>
           <a:lnRef idx="1">
@@ -12428,27 +12429,31 @@
       </p:cxnSp>
       <p:cxnSp>
         <p:nvCxnSpPr>
-          <p:cNvPr id="27" name="Straight Connector 26">
+          <p:cNvPr id="53" name="Straight Arrow Connector 52">
             <a:extLst>
               <a:ext uri="{FF2B5EF4-FFF2-40B4-BE49-F238E27FC236}">
-                <a16:creationId xmlns:a16="http://schemas.microsoft.com/office/drawing/2014/main" id="{5A54FE05-E8B8-40A8-AF71-20AB7F6E1DFC}"/>
+                <a16:creationId xmlns:a16="http://schemas.microsoft.com/office/drawing/2014/main" id="{AAB82246-9985-452A-B816-0E7F4B8FFCD3}"/>
               </a:ext>
             </a:extLst>
           </p:cNvPr>
           <p:cNvCxnSpPr>
             <a:cxnSpLocks/>
-            <a:endCxn id="8" idx="1"/>
+            <a:stCxn id="20" idx="3"/>
+            <a:endCxn id="79" idx="1"/>
           </p:cNvCxnSpPr>
           <p:nvPr/>
         </p:nvCxnSpPr>
         <p:spPr>
           <a:xfrm flipV="1">
-            <a:off x="810323" y="2762150"/>
-            <a:ext cx="1574264" cy="785000"/>
-          </a:xfrm>
-          <a:prstGeom prst="line">
+            <a:off x="986885" y="2456653"/>
+            <a:ext cx="1580630" cy="587939"/>
+          </a:xfrm>
+          <a:prstGeom prst="straightConnector1">
             <a:avLst/>
           </a:prstGeom>
+          <a:ln>
+            <a:tailEnd type="triangle"/>
+          </a:ln>
         </p:spPr>
         <p:style>
           <a:lnRef idx="1">
@@ -12467,27 +12472,31 @@
       </p:cxnSp>
       <p:cxnSp>
         <p:nvCxnSpPr>
-          <p:cNvPr id="28" name="Straight Connector 27">
+          <p:cNvPr id="56" name="Straight Arrow Connector 55">
             <a:extLst>
               <a:ext uri="{FF2B5EF4-FFF2-40B4-BE49-F238E27FC236}">
-                <a16:creationId xmlns:a16="http://schemas.microsoft.com/office/drawing/2014/main" id="{446ACC9B-98F0-45AB-81BB-CEA5E5A0AA4A}"/>
+                <a16:creationId xmlns:a16="http://schemas.microsoft.com/office/drawing/2014/main" id="{A94B30B9-A56D-4AA9-B9BC-3588BF233AF7}"/>
               </a:ext>
             </a:extLst>
           </p:cNvPr>
           <p:cNvCxnSpPr>
             <a:cxnSpLocks/>
-            <a:endCxn id="8" idx="1"/>
+            <a:stCxn id="22" idx="3"/>
+            <a:endCxn id="79" idx="1"/>
           </p:cNvCxnSpPr>
           <p:nvPr/>
         </p:nvCxnSpPr>
         <p:spPr>
           <a:xfrm flipV="1">
-            <a:off x="810323" y="2762150"/>
-            <a:ext cx="1574264" cy="1658856"/>
-          </a:xfrm>
-          <a:prstGeom prst="line">
+            <a:off x="986885" y="2456653"/>
+            <a:ext cx="1580630" cy="1238852"/>
+          </a:xfrm>
+          <a:prstGeom prst="straightConnector1">
             <a:avLst/>
           </a:prstGeom>
+          <a:ln>
+            <a:tailEnd type="triangle"/>
+          </a:ln>
         </p:spPr>
         <p:style>
           <a:lnRef idx="1">
@@ -12506,10 +12515,10 @@
       </p:cxnSp>
       <p:sp>
         <p:nvSpPr>
-          <p:cNvPr id="41" name="TextBox 40">
+          <p:cNvPr id="66" name="TextBox 65">
             <a:extLst>
               <a:ext uri="{FF2B5EF4-FFF2-40B4-BE49-F238E27FC236}">
-                <a16:creationId xmlns:a16="http://schemas.microsoft.com/office/drawing/2014/main" id="{771753D3-3EA5-4F09-8C56-A980620B9DC4}"/>
+                <a16:creationId xmlns:a16="http://schemas.microsoft.com/office/drawing/2014/main" id="{3A044C05-8610-470B-BCE3-71A497C3A49C}"/>
               </a:ext>
             </a:extLst>
           </p:cNvPr>
@@ -12518,8 +12527,8 @@
         </p:nvSpPr>
         <p:spPr>
           <a:xfrm>
-            <a:off x="2355251" y="3287152"/>
-            <a:ext cx="1855506" cy="369332"/>
+            <a:off x="2842893" y="1810851"/>
+            <a:ext cx="1108723" cy="246221"/>
           </a:xfrm>
           <a:prstGeom prst="rect">
             <a:avLst/>
@@ -12533,22 +12542,22 @@
           <a:lstStyle/>
           <a:p>
             <a:r>
-              <a:rPr lang="en-US" dirty="0">
+              <a:rPr lang="en-US" sz="1000" dirty="0">
                 <a:solidFill>
                   <a:schemeClr val="bg1"/>
                 </a:solidFill>
               </a:rPr>
-              <a:t>Review uploader</a:t>
+              <a:t>User Application</a:t>
             </a:r>
           </a:p>
         </p:txBody>
       </p:sp>
       <p:pic>
         <p:nvPicPr>
-          <p:cNvPr id="46" name="Picture 45" descr="A close up of a sign&#10;&#10;Description automatically generated">
+          <p:cNvPr id="70" name="Graphic 69" descr="Bar chart">
             <a:extLst>
               <a:ext uri="{FF2B5EF4-FFF2-40B4-BE49-F238E27FC236}">
-                <a16:creationId xmlns:a16="http://schemas.microsoft.com/office/drawing/2014/main" id="{7A6BCEF5-7867-4C71-A506-9217F8ADC83D}"/>
+                <a16:creationId xmlns:a16="http://schemas.microsoft.com/office/drawing/2014/main" id="{0B630A2E-F362-4FC2-B908-BA656BC48DFD}"/>
               </a:ext>
             </a:extLst>
           </p:cNvPr>
@@ -12558,21 +12567,224 @@
           <p:nvPr/>
         </p:nvPicPr>
         <p:blipFill>
-          <a:blip r:embed="rId8"/>
+          <a:blip r:embed="rId14">
+            <a:extLst>
+              <a:ext uri="{96DAC541-7B7A-43D3-8B79-37D633B846F1}">
+                <asvg:svgBlip xmlns:asvg="http://schemas.microsoft.com/office/drawing/2016/SVG/main" r:embed="rId15"/>
+              </a:ext>
+            </a:extLst>
+          </a:blip>
           <a:stretch>
             <a:fillRect/>
           </a:stretch>
         </p:blipFill>
         <p:spPr>
           <a:xfrm>
-            <a:off x="5010647" y="821083"/>
-            <a:ext cx="1216405" cy="1030467"/>
+            <a:off x="2842893" y="2012983"/>
+            <a:ext cx="914400" cy="914400"/>
           </a:xfrm>
           <a:prstGeom prst="rect">
             <a:avLst/>
           </a:prstGeom>
         </p:spPr>
       </p:pic>
+      <p:pic>
+        <p:nvPicPr>
+          <p:cNvPr id="72" name="Graphic 71" descr="Processor">
+            <a:extLst>
+              <a:ext uri="{FF2B5EF4-FFF2-40B4-BE49-F238E27FC236}">
+                <a16:creationId xmlns:a16="http://schemas.microsoft.com/office/drawing/2014/main" id="{6E130637-27DE-423A-9CD2-1F482C79219F}"/>
+              </a:ext>
+            </a:extLst>
+          </p:cNvPr>
+          <p:cNvPicPr>
+            <a:picLocks noChangeAspect="1"/>
+          </p:cNvPicPr>
+          <p:nvPr/>
+        </p:nvPicPr>
+        <p:blipFill>
+          <a:blip r:embed="rId16">
+            <a:extLst>
+              <a:ext uri="{96DAC541-7B7A-43D3-8B79-37D633B846F1}">
+                <asvg:svgBlip xmlns:asvg="http://schemas.microsoft.com/office/drawing/2016/SVG/main" r:embed="rId17"/>
+              </a:ext>
+            </a:extLst>
+          </a:blip>
+          <a:stretch>
+            <a:fillRect/>
+          </a:stretch>
+        </p:blipFill>
+        <p:spPr>
+          <a:xfrm>
+            <a:off x="5220422" y="2694469"/>
+            <a:ext cx="914400" cy="914400"/>
+          </a:xfrm>
+          <a:prstGeom prst="rect">
+            <a:avLst/>
+          </a:prstGeom>
+        </p:spPr>
+      </p:pic>
+      <p:sp>
+        <p:nvSpPr>
+          <p:cNvPr id="73" name="TextBox 72">
+            <a:extLst>
+              <a:ext uri="{FF2B5EF4-FFF2-40B4-BE49-F238E27FC236}">
+                <a16:creationId xmlns:a16="http://schemas.microsoft.com/office/drawing/2014/main" id="{7A22F177-2115-47E7-BE4A-411F804037F8}"/>
+              </a:ext>
+            </a:extLst>
+          </p:cNvPr>
+          <p:cNvSpPr txBox="1"/>
+          <p:nvPr/>
+        </p:nvSpPr>
+        <p:spPr>
+          <a:xfrm>
+            <a:off x="5723182" y="3748895"/>
+            <a:ext cx="1686567" cy="246221"/>
+          </a:xfrm>
+          <a:prstGeom prst="rect">
+            <a:avLst/>
+          </a:prstGeom>
+          <a:noFill/>
+        </p:spPr>
+        <p:txBody>
+          <a:bodyPr wrap="square" rtlCol="0">
+            <a:spAutoFit/>
+          </a:bodyPr>
+          <a:lstStyle/>
+          <a:p>
+            <a:r>
+              <a:rPr lang="en-US" sz="1000" dirty="0">
+                <a:solidFill>
+                  <a:schemeClr val="bg1"/>
+                </a:solidFill>
+              </a:rPr>
+              <a:t>Review  Analyzer REST API</a:t>
+            </a:r>
+          </a:p>
+        </p:txBody>
+      </p:sp>
+      <p:cxnSp>
+        <p:nvCxnSpPr>
+          <p:cNvPr id="77" name="Straight Arrow Connector 76">
+            <a:extLst>
+              <a:ext uri="{FF2B5EF4-FFF2-40B4-BE49-F238E27FC236}">
+                <a16:creationId xmlns:a16="http://schemas.microsoft.com/office/drawing/2014/main" id="{835DC92D-D47B-4FE0-BEFC-5788DBDAA693}"/>
+              </a:ext>
+            </a:extLst>
+          </p:cNvPr>
+          <p:cNvCxnSpPr>
+            <a:cxnSpLocks/>
+            <a:stCxn id="79" idx="3"/>
+            <a:endCxn id="90" idx="1"/>
+          </p:cNvCxnSpPr>
+          <p:nvPr/>
+        </p:nvCxnSpPr>
+        <p:spPr>
+          <a:xfrm flipV="1">
+            <a:off x="4143028" y="2438397"/>
+            <a:ext cx="811926" cy="18256"/>
+          </a:xfrm>
+          <a:prstGeom prst="straightConnector1">
+            <a:avLst/>
+          </a:prstGeom>
+          <a:ln>
+            <a:headEnd type="triangle"/>
+            <a:tailEnd type="triangle"/>
+          </a:ln>
+        </p:spPr>
+        <p:style>
+          <a:lnRef idx="1">
+            <a:schemeClr val="accent1"/>
+          </a:lnRef>
+          <a:fillRef idx="0">
+            <a:schemeClr val="accent1"/>
+          </a:fillRef>
+          <a:effectRef idx="0">
+            <a:schemeClr val="accent1"/>
+          </a:effectRef>
+          <a:fontRef idx="minor">
+            <a:schemeClr val="tx1"/>
+          </a:fontRef>
+        </p:style>
+      </p:cxnSp>
+      <p:sp>
+        <p:nvSpPr>
+          <p:cNvPr id="91" name="TextBox 90">
+            <a:extLst>
+              <a:ext uri="{FF2B5EF4-FFF2-40B4-BE49-F238E27FC236}">
+                <a16:creationId xmlns:a16="http://schemas.microsoft.com/office/drawing/2014/main" id="{2F85DF01-476D-4AC4-8866-275677D5FEF8}"/>
+              </a:ext>
+            </a:extLst>
+          </p:cNvPr>
+          <p:cNvSpPr txBox="1"/>
+          <p:nvPr/>
+        </p:nvSpPr>
+        <p:spPr>
+          <a:xfrm>
+            <a:off x="104426" y="4059776"/>
+            <a:ext cx="1985516" cy="246221"/>
+          </a:xfrm>
+          <a:prstGeom prst="rect">
+            <a:avLst/>
+          </a:prstGeom>
+          <a:noFill/>
+        </p:spPr>
+        <p:txBody>
+          <a:bodyPr wrap="square" rtlCol="0">
+            <a:spAutoFit/>
+          </a:bodyPr>
+          <a:lstStyle/>
+          <a:p>
+            <a:r>
+              <a:rPr lang="en-US" sz="1000" dirty="0">
+                <a:solidFill>
+                  <a:schemeClr val="bg1"/>
+                </a:solidFill>
+              </a:rPr>
+              <a:t>Reviews/ Sentiments Data Sources</a:t>
+            </a:r>
+          </a:p>
+        </p:txBody>
+      </p:sp>
+      <p:sp>
+        <p:nvSpPr>
+          <p:cNvPr id="105" name="TextBox 104">
+            <a:extLst>
+              <a:ext uri="{FF2B5EF4-FFF2-40B4-BE49-F238E27FC236}">
+                <a16:creationId xmlns:a16="http://schemas.microsoft.com/office/drawing/2014/main" id="{1DF6B13B-ABAB-4017-83E1-48ECC6C99AAA}"/>
+              </a:ext>
+            </a:extLst>
+          </p:cNvPr>
+          <p:cNvSpPr txBox="1"/>
+          <p:nvPr/>
+        </p:nvSpPr>
+        <p:spPr>
+          <a:xfrm>
+            <a:off x="2562399" y="3141267"/>
+            <a:ext cx="1580630" cy="707886"/>
+          </a:xfrm>
+          <a:prstGeom prst="rect">
+            <a:avLst/>
+          </a:prstGeom>
+          <a:noFill/>
+        </p:spPr>
+        <p:txBody>
+          <a:bodyPr wrap="square" rtlCol="0">
+            <a:spAutoFit/>
+          </a:bodyPr>
+          <a:lstStyle/>
+          <a:p>
+            <a:r>
+              <a:rPr lang="en-US" sz="1000" dirty="0">
+                <a:solidFill>
+                  <a:schemeClr val="bg1"/>
+                </a:solidFill>
+              </a:rPr>
+              <a:t>Application will display customer sentiments in Graphical view for the reviews data specified</a:t>
+            </a:r>
+          </a:p>
+        </p:txBody>
+      </p:sp>
     </p:spTree>
     <p:extLst>
       <p:ext uri="{BB962C8B-B14F-4D97-AF65-F5344CB8AC3E}">
@@ -13608,21 +13820,6 @@
 </file>
 
 <file path=customXml/item1.xml><?xml version="1.0" encoding="utf-8"?>
-<?mso-contentType ?>
-<FormTemplates xmlns="http://schemas.microsoft.com/sharepoint/v3/contenttype/forms">
-  <Display>DocumentLibraryForm</Display>
-  <Edit>DocumentLibraryForm</Edit>
-  <New>DocumentLibraryForm</New>
-</FormTemplates>
-</file>
-
-<file path=customXml/item2.xml><?xml version="1.0" encoding="utf-8"?>
-<p:properties xmlns:p="http://schemas.microsoft.com/office/2006/metadata/properties" xmlns:xsi="http://www.w3.org/2001/XMLSchema-instance" xmlns:pc="http://schemas.microsoft.com/office/infopath/2007/PartnerControls">
-  <documentManagement/>
-</p:properties>
-</file>
-
-<file path=customXml/item3.xml><?xml version="1.0" encoding="utf-8"?>
 <ct:contentTypeSchema xmlns:ct="http://schemas.microsoft.com/office/2006/metadata/contentType" xmlns:ma="http://schemas.microsoft.com/office/2006/metadata/properties/metaAttributes" ct:_="" ma:_="" ma:contentTypeName="Document" ma:contentTypeID="0x0101008FDE80407D6F394FBF0AE466E4A0DAFB" ma:contentTypeVersion="4" ma:contentTypeDescription="Create a new document." ma:contentTypeScope="" ma:versionID="61d01ef4944ecd915501b2eb45ca1484">
   <xsd:schema xmlns:xsd="http://www.w3.org/2001/XMLSchema" xmlns:xs="http://www.w3.org/2001/XMLSchema" xmlns:p="http://schemas.microsoft.com/office/2006/metadata/properties" xmlns:ns2="4d2cd3c0-2c96-4089-8025-40a4f8fed35c" xmlns:ns3="5ebbaec0-0e71-40b9-a37f-36be39db429c" targetNamespace="http://schemas.microsoft.com/office/2006/metadata/properties" ma:root="true" ma:fieldsID="d95c189d0d130f13bfc32339ad6c8651" ns2:_="" ns3:_="">
     <xsd:import namespace="4d2cd3c0-2c96-4089-8025-40a4f8fed35c"/>
@@ -13787,10 +13984,36 @@
 </ct:contentTypeSchema>
 </file>
 
+<file path=customXml/item2.xml><?xml version="1.0" encoding="utf-8"?>
+<p:properties xmlns:p="http://schemas.microsoft.com/office/2006/metadata/properties" xmlns:xsi="http://www.w3.org/2001/XMLSchema-instance" xmlns:pc="http://schemas.microsoft.com/office/infopath/2007/PartnerControls">
+  <documentManagement/>
+</p:properties>
+</file>
+
+<file path=customXml/item3.xml><?xml version="1.0" encoding="utf-8"?>
+<?mso-contentType ?>
+<FormTemplates xmlns="http://schemas.microsoft.com/sharepoint/v3/contenttype/forms">
+  <Display>DocumentLibraryForm</Display>
+  <Edit>DocumentLibraryForm</Edit>
+  <New>DocumentLibraryForm</New>
+</FormTemplates>
+</file>
+
 <file path=customXml/itemProps1.xml><?xml version="1.0" encoding="utf-8"?>
-<ds:datastoreItem xmlns:ds="http://schemas.openxmlformats.org/officeDocument/2006/customXml" ds:itemID="{79EBE94C-290C-435C-99BA-BBC0E8BB5EFA}">
+<ds:datastoreItem xmlns:ds="http://schemas.openxmlformats.org/officeDocument/2006/customXml" ds:itemID="{B526E34D-0337-419F-BD45-5BB384D04CA9}">
   <ds:schemaRefs>
-    <ds:schemaRef ds:uri="http://schemas.microsoft.com/sharepoint/v3/contenttype/forms"/>
+    <ds:schemaRef ds:uri="http://schemas.microsoft.com/office/2006/metadata/contentType"/>
+    <ds:schemaRef ds:uri="http://schemas.microsoft.com/office/2006/metadata/properties/metaAttributes"/>
+    <ds:schemaRef ds:uri="http://www.w3.org/2001/XMLSchema"/>
+    <ds:schemaRef ds:uri="http://schemas.microsoft.com/office/2006/metadata/properties"/>
+    <ds:schemaRef ds:uri="4d2cd3c0-2c96-4089-8025-40a4f8fed35c"/>
+    <ds:schemaRef ds:uri="5ebbaec0-0e71-40b9-a37f-36be39db429c"/>
+    <ds:schemaRef ds:uri="http://schemas.microsoft.com/office/2006/documentManagement/types"/>
+    <ds:schemaRef ds:uri="http://schemas.microsoft.com/office/infopath/2007/PartnerControls"/>
+    <ds:schemaRef ds:uri="http://schemas.openxmlformats.org/package/2006/metadata/core-properties"/>
+    <ds:schemaRef ds:uri="http://purl.org/dc/elements/1.1/"/>
+    <ds:schemaRef ds:uri="http://purl.org/dc/terms/"/>
+    <ds:schemaRef ds:uri="http://schemas.microsoft.com/internal/obd"/>
   </ds:schemaRefs>
 </ds:datastoreItem>
 </file>
@@ -13813,20 +14036,9 @@
 </file>
 
 <file path=customXml/itemProps3.xml><?xml version="1.0" encoding="utf-8"?>
-<ds:datastoreItem xmlns:ds="http://schemas.openxmlformats.org/officeDocument/2006/customXml" ds:itemID="{B526E34D-0337-419F-BD45-5BB384D04CA9}">
+<ds:datastoreItem xmlns:ds="http://schemas.openxmlformats.org/officeDocument/2006/customXml" ds:itemID="{79EBE94C-290C-435C-99BA-BBC0E8BB5EFA}">
   <ds:schemaRefs>
-    <ds:schemaRef ds:uri="http://schemas.microsoft.com/office/2006/metadata/contentType"/>
-    <ds:schemaRef ds:uri="http://schemas.microsoft.com/office/2006/metadata/properties/metaAttributes"/>
-    <ds:schemaRef ds:uri="http://www.w3.org/2001/XMLSchema"/>
-    <ds:schemaRef ds:uri="http://schemas.microsoft.com/office/2006/metadata/properties"/>
-    <ds:schemaRef ds:uri="4d2cd3c0-2c96-4089-8025-40a4f8fed35c"/>
-    <ds:schemaRef ds:uri="5ebbaec0-0e71-40b9-a37f-36be39db429c"/>
-    <ds:schemaRef ds:uri="http://schemas.microsoft.com/office/2006/documentManagement/types"/>
-    <ds:schemaRef ds:uri="http://schemas.microsoft.com/office/infopath/2007/PartnerControls"/>
-    <ds:schemaRef ds:uri="http://schemas.openxmlformats.org/package/2006/metadata/core-properties"/>
-    <ds:schemaRef ds:uri="http://purl.org/dc/elements/1.1/"/>
-    <ds:schemaRef ds:uri="http://purl.org/dc/terms/"/>
-    <ds:schemaRef ds:uri="http://schemas.microsoft.com/internal/obd"/>
+    <ds:schemaRef ds:uri="http://schemas.microsoft.com/sharepoint/v3/contenttype/forms"/>
   </ds:schemaRefs>
 </ds:datastoreItem>
 </file>
</xml_diff>

<commit_message>
Modified PPT to add algorithm results
</commit_message>
<xml_diff>
--- a/Review and analysis.pptx
+++ b/Review and analysis.pptx
@@ -227,7 +227,7 @@
           <a:p>
             <a:fld id="{462412A6-D889-854E-ACDD-CE38088E23A3}" type="datetimeFigureOut">
               <a:rPr lang="en-US" smtClean="0"/>
-              <a:t>12/10/2019</a:t>
+              <a:t>12/11/2019</a:t>
             </a:fld>
             <a:endParaRPr lang="en-US"/>
           </a:p>
@@ -11509,7 +11509,7 @@
                 <a:latin typeface="Avenir Next Ultra Light"/>
                 <a:cs typeface="Avenir Next Ultra Light"/>
               </a:rPr>
-              <a:t>12/10/2019</a:t>
+              <a:t>12/11/2019</a:t>
             </a:fld>
             <a:endParaRPr lang="en-US" dirty="0">
               <a:solidFill>
@@ -11724,8 +11724,8 @@
         </p:nvSpPr>
         <p:spPr>
           <a:xfrm>
-            <a:off x="4954954" y="711197"/>
-            <a:ext cx="3040183" cy="3454400"/>
+            <a:off x="3970215" y="711196"/>
+            <a:ext cx="4980960" cy="3931141"/>
           </a:xfrm>
           <a:prstGeom prst="rect">
             <a:avLst/>
@@ -11781,7 +11781,7 @@
         </p:nvSpPr>
         <p:spPr>
           <a:xfrm>
-            <a:off x="2567515" y="910265"/>
+            <a:off x="1848503" y="910265"/>
             <a:ext cx="1575513" cy="3092776"/>
           </a:xfrm>
           <a:prstGeom prst="rect">
@@ -11852,7 +11852,7 @@
         </p:blipFill>
         <p:spPr>
           <a:xfrm>
-            <a:off x="2749507" y="793936"/>
+            <a:off x="2030495" y="793936"/>
             <a:ext cx="1108723" cy="1108723"/>
           </a:xfrm>
           <a:prstGeom prst="rect">
@@ -12090,7 +12090,7 @@
         </p:blipFill>
         <p:spPr>
           <a:xfrm>
-            <a:off x="5176681" y="1254171"/>
+            <a:off x="4191942" y="1254171"/>
             <a:ext cx="1001883" cy="1001883"/>
           </a:xfrm>
           <a:prstGeom prst="rect">
@@ -12126,7 +12126,7 @@
         </p:blipFill>
         <p:spPr>
           <a:xfrm>
-            <a:off x="6869661" y="1308467"/>
+            <a:off x="5884922" y="1308467"/>
             <a:ext cx="914400" cy="914400"/>
           </a:xfrm>
           <a:prstGeom prst="rect">
@@ -12151,7 +12151,7 @@
         </p:nvCxnSpPr>
         <p:spPr>
           <a:xfrm flipH="1" flipV="1">
-            <a:off x="6178564" y="1755113"/>
+            <a:off x="5193825" y="1755113"/>
             <a:ext cx="691097" cy="10554"/>
           </a:xfrm>
           <a:prstGeom prst="straightConnector1">
@@ -12194,7 +12194,7 @@
         </p:nvCxnSpPr>
         <p:spPr>
           <a:xfrm flipH="1">
-            <a:off x="5677622" y="2256054"/>
+            <a:off x="4692883" y="2256054"/>
             <a:ext cx="1" cy="438415"/>
           </a:xfrm>
           <a:prstGeom prst="straightConnector1">
@@ -12234,8 +12234,8 @@
         </p:nvSpPr>
         <p:spPr>
           <a:xfrm>
-            <a:off x="5023554" y="690106"/>
-            <a:ext cx="2971583" cy="553998"/>
+            <a:off x="4062260" y="744811"/>
+            <a:ext cx="3432404" cy="400110"/>
           </a:xfrm>
           <a:prstGeom prst="rect">
             <a:avLst/>
@@ -12273,7 +12273,7 @@
         </p:nvSpPr>
         <p:spPr>
           <a:xfrm>
-            <a:off x="6904087" y="2140638"/>
+            <a:off x="5897672" y="2246631"/>
             <a:ext cx="1006398" cy="246221"/>
           </a:xfrm>
           <a:prstGeom prst="rect">
@@ -12317,7 +12317,7 @@
         <p:spPr>
           <a:xfrm>
             <a:off x="976455" y="1239734"/>
-            <a:ext cx="1591060" cy="1216919"/>
+            <a:ext cx="872048" cy="1216919"/>
           </a:xfrm>
           <a:prstGeom prst="straightConnector1">
             <a:avLst/>
@@ -12360,7 +12360,7 @@
         <p:spPr>
           <a:xfrm>
             <a:off x="971789" y="1799703"/>
-            <a:ext cx="1595726" cy="656950"/>
+            <a:ext cx="876714" cy="656950"/>
           </a:xfrm>
           <a:prstGeom prst="straightConnector1">
             <a:avLst/>
@@ -12403,7 +12403,7 @@
         <p:spPr>
           <a:xfrm>
             <a:off x="969930" y="2399974"/>
-            <a:ext cx="1597585" cy="56679"/>
+            <a:ext cx="878573" cy="56679"/>
           </a:xfrm>
           <a:prstGeom prst="straightConnector1">
             <a:avLst/>
@@ -12446,7 +12446,7 @@
         <p:spPr>
           <a:xfrm flipV="1">
             <a:off x="986885" y="2456653"/>
-            <a:ext cx="1580630" cy="587939"/>
+            <a:ext cx="861618" cy="587939"/>
           </a:xfrm>
           <a:prstGeom prst="straightConnector1">
             <a:avLst/>
@@ -12489,7 +12489,7 @@
         <p:spPr>
           <a:xfrm flipV="1">
             <a:off x="986885" y="2456653"/>
-            <a:ext cx="1580630" cy="1238852"/>
+            <a:ext cx="861618" cy="1238852"/>
           </a:xfrm>
           <a:prstGeom prst="straightConnector1">
             <a:avLst/>
@@ -12527,7 +12527,7 @@
         </p:nvSpPr>
         <p:spPr>
           <a:xfrm>
-            <a:off x="2842893" y="1810851"/>
+            <a:off x="2123881" y="1810851"/>
             <a:ext cx="1108723" cy="246221"/>
           </a:xfrm>
           <a:prstGeom prst="rect">
@@ -12580,7 +12580,7 @@
         </p:blipFill>
         <p:spPr>
           <a:xfrm>
-            <a:off x="2842893" y="2012983"/>
+            <a:off x="2123881" y="2012983"/>
             <a:ext cx="914400" cy="914400"/>
           </a:xfrm>
           <a:prstGeom prst="rect">
@@ -12616,7 +12616,7 @@
         </p:blipFill>
         <p:spPr>
           <a:xfrm>
-            <a:off x="5220422" y="2694469"/>
+            <a:off x="4235683" y="2694469"/>
             <a:ext cx="914400" cy="914400"/>
           </a:xfrm>
           <a:prstGeom prst="rect">
@@ -12638,7 +12638,7 @@
         </p:nvSpPr>
         <p:spPr>
           <a:xfrm>
-            <a:off x="5723182" y="3748895"/>
+            <a:off x="5498838" y="4282398"/>
             <a:ext cx="1686567" cy="246221"/>
           </a:xfrm>
           <a:prstGeom prst="rect">
@@ -12674,15 +12674,14 @@
           </p:cNvPr>
           <p:cNvCxnSpPr>
             <a:cxnSpLocks/>
-            <a:stCxn id="79" idx="3"/>
             <a:endCxn id="90" idx="1"/>
           </p:cNvCxnSpPr>
           <p:nvPr/>
         </p:nvCxnSpPr>
         <p:spPr>
-          <a:xfrm flipV="1">
-            <a:off x="4143028" y="2438397"/>
-            <a:ext cx="811926" cy="18256"/>
+          <a:xfrm>
+            <a:off x="3424016" y="2676767"/>
+            <a:ext cx="546199" cy="0"/>
           </a:xfrm>
           <a:prstGeom prst="straightConnector1">
             <a:avLst/>
@@ -12760,7 +12759,7 @@
         </p:nvSpPr>
         <p:spPr>
           <a:xfrm>
-            <a:off x="2562399" y="3141267"/>
+            <a:off x="1843387" y="3141267"/>
             <a:ext cx="1580630" cy="707886"/>
           </a:xfrm>
           <a:prstGeom prst="rect">
@@ -12785,6 +12784,43 @@
           </a:p>
         </p:txBody>
       </p:sp>
+      <p:pic>
+        <p:nvPicPr>
+          <p:cNvPr id="7" name="Picture 6">
+            <a:extLst>
+              <a:ext uri="{FF2B5EF4-FFF2-40B4-BE49-F238E27FC236}">
+                <a16:creationId xmlns:a16="http://schemas.microsoft.com/office/drawing/2014/main" id="{25B20B9F-C53E-432E-BA6F-C540FBB42B71}"/>
+              </a:ext>
+            </a:extLst>
+          </p:cNvPr>
+          <p:cNvPicPr>
+            <a:picLocks noChangeAspect="1"/>
+          </p:cNvPicPr>
+          <p:nvPr/>
+        </p:nvPicPr>
+        <p:blipFill>
+          <a:blip r:embed="rId18"/>
+          <a:stretch>
+            <a:fillRect/>
+          </a:stretch>
+        </p:blipFill>
+        <p:spPr>
+          <a:xfrm>
+            <a:off x="5343796" y="2637839"/>
+            <a:ext cx="3432404" cy="1228067"/>
+          </a:xfrm>
+          <a:prstGeom prst="rect">
+            <a:avLst/>
+          </a:prstGeom>
+          <a:effectLst>
+            <a:glow rad="101600">
+              <a:schemeClr val="bg1">
+                <a:alpha val="60000"/>
+              </a:schemeClr>
+            </a:glow>
+          </a:effectLst>
+        </p:spPr>
+      </p:pic>
     </p:spTree>
     <p:extLst>
       <p:ext uri="{BB962C8B-B14F-4D97-AF65-F5344CB8AC3E}">
@@ -13820,6 +13856,21 @@
 </file>
 
 <file path=customXml/item1.xml><?xml version="1.0" encoding="utf-8"?>
+<?mso-contentType ?>
+<FormTemplates xmlns="http://schemas.microsoft.com/sharepoint/v3/contenttype/forms">
+  <Display>DocumentLibraryForm</Display>
+  <Edit>DocumentLibraryForm</Edit>
+  <New>DocumentLibraryForm</New>
+</FormTemplates>
+</file>
+
+<file path=customXml/item2.xml><?xml version="1.0" encoding="utf-8"?>
+<p:properties xmlns:p="http://schemas.microsoft.com/office/2006/metadata/properties" xmlns:xsi="http://www.w3.org/2001/XMLSchema-instance" xmlns:pc="http://schemas.microsoft.com/office/infopath/2007/PartnerControls">
+  <documentManagement/>
+</p:properties>
+</file>
+
+<file path=customXml/item3.xml><?xml version="1.0" encoding="utf-8"?>
 <ct:contentTypeSchema xmlns:ct="http://schemas.microsoft.com/office/2006/metadata/contentType" xmlns:ma="http://schemas.microsoft.com/office/2006/metadata/properties/metaAttributes" ct:_="" ma:_="" ma:contentTypeName="Document" ma:contentTypeID="0x0101008FDE80407D6F394FBF0AE466E4A0DAFB" ma:contentTypeVersion="4" ma:contentTypeDescription="Create a new document." ma:contentTypeScope="" ma:versionID="61d01ef4944ecd915501b2eb45ca1484">
   <xsd:schema xmlns:xsd="http://www.w3.org/2001/XMLSchema" xmlns:xs="http://www.w3.org/2001/XMLSchema" xmlns:p="http://schemas.microsoft.com/office/2006/metadata/properties" xmlns:ns2="4d2cd3c0-2c96-4089-8025-40a4f8fed35c" xmlns:ns3="5ebbaec0-0e71-40b9-a37f-36be39db429c" targetNamespace="http://schemas.microsoft.com/office/2006/metadata/properties" ma:root="true" ma:fieldsID="d95c189d0d130f13bfc32339ad6c8651" ns2:_="" ns3:_="">
     <xsd:import namespace="4d2cd3c0-2c96-4089-8025-40a4f8fed35c"/>
@@ -13984,36 +14035,10 @@
 </ct:contentTypeSchema>
 </file>
 
-<file path=customXml/item2.xml><?xml version="1.0" encoding="utf-8"?>
-<p:properties xmlns:p="http://schemas.microsoft.com/office/2006/metadata/properties" xmlns:xsi="http://www.w3.org/2001/XMLSchema-instance" xmlns:pc="http://schemas.microsoft.com/office/infopath/2007/PartnerControls">
-  <documentManagement/>
-</p:properties>
-</file>
-
-<file path=customXml/item3.xml><?xml version="1.0" encoding="utf-8"?>
-<?mso-contentType ?>
-<FormTemplates xmlns="http://schemas.microsoft.com/sharepoint/v3/contenttype/forms">
-  <Display>DocumentLibraryForm</Display>
-  <Edit>DocumentLibraryForm</Edit>
-  <New>DocumentLibraryForm</New>
-</FormTemplates>
-</file>
-
 <file path=customXml/itemProps1.xml><?xml version="1.0" encoding="utf-8"?>
-<ds:datastoreItem xmlns:ds="http://schemas.openxmlformats.org/officeDocument/2006/customXml" ds:itemID="{B526E34D-0337-419F-BD45-5BB384D04CA9}">
+<ds:datastoreItem xmlns:ds="http://schemas.openxmlformats.org/officeDocument/2006/customXml" ds:itemID="{79EBE94C-290C-435C-99BA-BBC0E8BB5EFA}">
   <ds:schemaRefs>
-    <ds:schemaRef ds:uri="http://schemas.microsoft.com/office/2006/metadata/contentType"/>
-    <ds:schemaRef ds:uri="http://schemas.microsoft.com/office/2006/metadata/properties/metaAttributes"/>
-    <ds:schemaRef ds:uri="http://www.w3.org/2001/XMLSchema"/>
-    <ds:schemaRef ds:uri="http://schemas.microsoft.com/office/2006/metadata/properties"/>
-    <ds:schemaRef ds:uri="4d2cd3c0-2c96-4089-8025-40a4f8fed35c"/>
-    <ds:schemaRef ds:uri="5ebbaec0-0e71-40b9-a37f-36be39db429c"/>
-    <ds:schemaRef ds:uri="http://schemas.microsoft.com/office/2006/documentManagement/types"/>
-    <ds:schemaRef ds:uri="http://schemas.microsoft.com/office/infopath/2007/PartnerControls"/>
-    <ds:schemaRef ds:uri="http://schemas.openxmlformats.org/package/2006/metadata/core-properties"/>
-    <ds:schemaRef ds:uri="http://purl.org/dc/elements/1.1/"/>
-    <ds:schemaRef ds:uri="http://purl.org/dc/terms/"/>
-    <ds:schemaRef ds:uri="http://schemas.microsoft.com/internal/obd"/>
+    <ds:schemaRef ds:uri="http://schemas.microsoft.com/sharepoint/v3/contenttype/forms"/>
   </ds:schemaRefs>
 </ds:datastoreItem>
 </file>
@@ -14036,9 +14061,20 @@
 </file>
 
 <file path=customXml/itemProps3.xml><?xml version="1.0" encoding="utf-8"?>
-<ds:datastoreItem xmlns:ds="http://schemas.openxmlformats.org/officeDocument/2006/customXml" ds:itemID="{79EBE94C-290C-435C-99BA-BBC0E8BB5EFA}">
+<ds:datastoreItem xmlns:ds="http://schemas.openxmlformats.org/officeDocument/2006/customXml" ds:itemID="{B526E34D-0337-419F-BD45-5BB384D04CA9}">
   <ds:schemaRefs>
-    <ds:schemaRef ds:uri="http://schemas.microsoft.com/sharepoint/v3/contenttype/forms"/>
+    <ds:schemaRef ds:uri="http://schemas.microsoft.com/office/2006/metadata/contentType"/>
+    <ds:schemaRef ds:uri="http://schemas.microsoft.com/office/2006/metadata/properties/metaAttributes"/>
+    <ds:schemaRef ds:uri="http://www.w3.org/2001/XMLSchema"/>
+    <ds:schemaRef ds:uri="http://schemas.microsoft.com/office/2006/metadata/properties"/>
+    <ds:schemaRef ds:uri="4d2cd3c0-2c96-4089-8025-40a4f8fed35c"/>
+    <ds:schemaRef ds:uri="5ebbaec0-0e71-40b9-a37f-36be39db429c"/>
+    <ds:schemaRef ds:uri="http://schemas.microsoft.com/office/2006/documentManagement/types"/>
+    <ds:schemaRef ds:uri="http://schemas.microsoft.com/office/infopath/2007/PartnerControls"/>
+    <ds:schemaRef ds:uri="http://schemas.openxmlformats.org/package/2006/metadata/core-properties"/>
+    <ds:schemaRef ds:uri="http://purl.org/dc/elements/1.1/"/>
+    <ds:schemaRef ds:uri="http://purl.org/dc/terms/"/>
+    <ds:schemaRef ds:uri="http://schemas.microsoft.com/internal/obd"/>
   </ds:schemaRefs>
 </ds:datastoreItem>
 </file>
</xml_diff>

<commit_message>
Updated PPT from Namrata
</commit_message>
<xml_diff>
--- a/Review and analysis.pptx
+++ b/Review and analysis.pptx
@@ -5,16 +5,15 @@
     <p:sldMasterId id="2147483816" r:id="rId4"/>
   </p:sldMasterIdLst>
   <p:notesMasterIdLst>
-    <p:notesMasterId r:id="rId12"/>
+    <p:notesMasterId r:id="rId11"/>
   </p:notesMasterIdLst>
   <p:sldIdLst>
     <p:sldId id="257" r:id="rId5"/>
     <p:sldId id="263" r:id="rId6"/>
     <p:sldId id="351" r:id="rId7"/>
-    <p:sldId id="353" r:id="rId8"/>
-    <p:sldId id="354" r:id="rId9"/>
-    <p:sldId id="359" r:id="rId10"/>
-    <p:sldId id="358" r:id="rId11"/>
+    <p:sldId id="354" r:id="rId8"/>
+    <p:sldId id="359" r:id="rId9"/>
+    <p:sldId id="358" r:id="rId10"/>
   </p:sldIdLst>
   <p:sldSz cx="9144000" cy="5143500" type="screen16x9"/>
   <p:notesSz cx="6858000" cy="9144000"/>
@@ -227,7 +226,7 @@
           <a:p>
             <a:fld id="{462412A6-D889-854E-ACDD-CE38088E23A3}" type="datetimeFigureOut">
               <a:rPr lang="en-US" smtClean="0"/>
-              <a:t>12/11/2019</a:t>
+              <a:t>12/12/2019</a:t>
             </a:fld>
             <a:endParaRPr lang="en-US"/>
           </a:p>
@@ -627,6 +626,141 @@
           <a:bodyPr/>
           <a:lstStyle/>
           <a:p>
+            <a:r>
+              <a:rPr lang="en-US" dirty="0"/>
+              <a:t>Sentiment analysis can craft unstructured data into structured one</a:t>
+            </a:r>
+          </a:p>
+        </p:txBody>
+      </p:sp>
+      <p:sp>
+        <p:nvSpPr>
+          <p:cNvPr id="4" name="Slide Number Placeholder 3"/>
+          <p:cNvSpPr>
+            <a:spLocks noGrp="1"/>
+          </p:cNvSpPr>
+          <p:nvPr>
+            <p:ph type="sldNum" sz="quarter" idx="5"/>
+          </p:nvPr>
+        </p:nvSpPr>
+        <p:spPr/>
+        <p:txBody>
+          <a:bodyPr/>
+          <a:lstStyle/>
+          <a:p>
+            <a:fld id="{59BD4666-63B9-D545-9A4C-EE257FF4694B}" type="slidenum">
+              <a:rPr lang="en-US" smtClean="0"/>
+              <a:t>2</a:t>
+            </a:fld>
+            <a:endParaRPr lang="en-US"/>
+          </a:p>
+        </p:txBody>
+      </p:sp>
+    </p:spTree>
+    <p:extLst>
+      <p:ext uri="{BB962C8B-B14F-4D97-AF65-F5344CB8AC3E}">
+        <p14:creationId xmlns:p14="http://schemas.microsoft.com/office/powerpoint/2010/main" val="3275257111"/>
+      </p:ext>
+    </p:extLst>
+  </p:cSld>
+  <p:clrMapOvr>
+    <a:masterClrMapping/>
+  </p:clrMapOvr>
+</p:notes>
+</file>
+
+<file path=ppt/notesSlides/notesSlide3.xml><?xml version="1.0" encoding="utf-8"?>
+<p:notes xmlns:a="http://schemas.openxmlformats.org/drawingml/2006/main" xmlns:r="http://schemas.openxmlformats.org/officeDocument/2006/relationships" xmlns:p="http://schemas.openxmlformats.org/presentationml/2006/main">
+  <p:cSld>
+    <p:spTree>
+      <p:nvGrpSpPr>
+        <p:cNvPr id="1" name=""/>
+        <p:cNvGrpSpPr/>
+        <p:nvPr/>
+      </p:nvGrpSpPr>
+      <p:grpSpPr>
+        <a:xfrm>
+          <a:off x="0" y="0"/>
+          <a:ext cx="0" cy="0"/>
+          <a:chOff x="0" y="0"/>
+          <a:chExt cx="0" cy="0"/>
+        </a:xfrm>
+      </p:grpSpPr>
+      <p:sp>
+        <p:nvSpPr>
+          <p:cNvPr id="2" name="Slide Image Placeholder 1"/>
+          <p:cNvSpPr>
+            <a:spLocks noGrp="1" noRot="1" noChangeAspect="1"/>
+          </p:cNvSpPr>
+          <p:nvPr>
+            <p:ph type="sldImg"/>
+          </p:nvPr>
+        </p:nvSpPr>
+        <p:spPr/>
+      </p:sp>
+      <p:sp>
+        <p:nvSpPr>
+          <p:cNvPr id="3" name="Notes Placeholder 2"/>
+          <p:cNvSpPr>
+            <a:spLocks noGrp="1"/>
+          </p:cNvSpPr>
+          <p:nvPr>
+            <p:ph type="body" idx="1"/>
+          </p:nvPr>
+        </p:nvSpPr>
+        <p:spPr/>
+        <p:txBody>
+          <a:bodyPr/>
+          <a:lstStyle/>
+          <a:p>
+            <a:r>
+              <a:rPr lang="en-US" dirty="0"/>
+              <a:t>We can do sentiment analysis at document level and sentence level and at word level.</a:t>
+            </a:r>
+          </a:p>
+          <a:p>
+            <a:endParaRPr lang="en-US" dirty="0"/>
+          </a:p>
+          <a:p>
+            <a:pPr marL="228600" indent="-228600">
+              <a:buAutoNum type="arabicPeriod"/>
+            </a:pPr>
+            <a:r>
+              <a:rPr lang="en-US" dirty="0"/>
+              <a:t>Our web application is taking sample reviews as an input through a text file</a:t>
+            </a:r>
+          </a:p>
+          <a:p>
+            <a:pPr marL="228600" indent="-228600">
+              <a:buAutoNum type="arabicPeriod"/>
+            </a:pPr>
+            <a:r>
+              <a:rPr lang="en-US" dirty="0"/>
+              <a:t>Trained our model using our training data</a:t>
+            </a:r>
+          </a:p>
+          <a:p>
+            <a:pPr marL="228600" indent="-228600">
+              <a:buAutoNum type="arabicPeriod"/>
+            </a:pPr>
+            <a:r>
+              <a:rPr lang="en-US" dirty="0"/>
+              <a:t>These reviews are sent to our Review analyzer API. We have used supervised learning model using classification machine learning technique to classify between positive and negative comments</a:t>
+            </a:r>
+          </a:p>
+          <a:p>
+            <a:pPr marL="228600" indent="-228600">
+              <a:buAutoNum type="arabicPeriod"/>
+            </a:pPr>
+            <a:r>
+              <a:rPr lang="en-US" dirty="0"/>
+              <a:t>And finally our web application displays these reviews into graphical view</a:t>
+            </a:r>
+          </a:p>
+          <a:p>
+            <a:pPr marL="228600" indent="-228600">
+              <a:buAutoNum type="arabicPeriod"/>
+            </a:pPr>
             <a:endParaRPr lang="en-US" dirty="0"/>
           </a:p>
         </p:txBody>
@@ -658,6 +792,331 @@
     <p:extLst>
       <p:ext uri="{BB962C8B-B14F-4D97-AF65-F5344CB8AC3E}">
         <p14:creationId xmlns:p14="http://schemas.microsoft.com/office/powerpoint/2010/main" val="3151928853"/>
+      </p:ext>
+    </p:extLst>
+  </p:cSld>
+  <p:clrMapOvr>
+    <a:masterClrMapping/>
+  </p:clrMapOvr>
+</p:notes>
+</file>
+
+<file path=ppt/notesSlides/notesSlide4.xml><?xml version="1.0" encoding="utf-8"?>
+<p:notes xmlns:a="http://schemas.openxmlformats.org/drawingml/2006/main" xmlns:r="http://schemas.openxmlformats.org/officeDocument/2006/relationships" xmlns:p="http://schemas.openxmlformats.org/presentationml/2006/main">
+  <p:cSld>
+    <p:spTree>
+      <p:nvGrpSpPr>
+        <p:cNvPr id="1" name=""/>
+        <p:cNvGrpSpPr/>
+        <p:nvPr/>
+      </p:nvGrpSpPr>
+      <p:grpSpPr>
+        <a:xfrm>
+          <a:off x="0" y="0"/>
+          <a:ext cx="0" cy="0"/>
+          <a:chOff x="0" y="0"/>
+          <a:chExt cx="0" cy="0"/>
+        </a:xfrm>
+      </p:grpSpPr>
+      <p:sp>
+        <p:nvSpPr>
+          <p:cNvPr id="2" name="Slide Image Placeholder 1"/>
+          <p:cNvSpPr>
+            <a:spLocks noGrp="1" noRot="1" noChangeAspect="1"/>
+          </p:cNvSpPr>
+          <p:nvPr>
+            <p:ph type="sldImg"/>
+          </p:nvPr>
+        </p:nvSpPr>
+        <p:spPr/>
+      </p:sp>
+      <p:sp>
+        <p:nvSpPr>
+          <p:cNvPr id="3" name="Notes Placeholder 2"/>
+          <p:cNvSpPr>
+            <a:spLocks noGrp="1"/>
+          </p:cNvSpPr>
+          <p:nvPr>
+            <p:ph type="body" idx="1"/>
+          </p:nvPr>
+        </p:nvSpPr>
+        <p:spPr/>
+        <p:txBody>
+          <a:bodyPr/>
+          <a:lstStyle/>
+          <a:p>
+            <a:r>
+              <a:rPr lang="en-US" sz="1200" kern="1200" dirty="0">
+                <a:solidFill>
+                  <a:schemeClr val="tx1"/>
+                </a:solidFill>
+                <a:effectLst/>
+                <a:latin typeface="+mn-lt"/>
+                <a:ea typeface="+mn-ea"/>
+                <a:cs typeface="+mn-cs"/>
+              </a:rPr>
+              <a:t>It is super useful in analyzing customer inputs. This data can be utilized to make decisions to increase their revenue and it will help to remain competitive in the market. </a:t>
+            </a:r>
+          </a:p>
+          <a:p>
+            <a:br>
+              <a:rPr lang="en-US" sz="1200" kern="1200" dirty="0">
+                <a:solidFill>
+                  <a:schemeClr val="tx1"/>
+                </a:solidFill>
+                <a:effectLst/>
+                <a:latin typeface="+mn-lt"/>
+                <a:ea typeface="+mn-ea"/>
+                <a:cs typeface="+mn-cs"/>
+              </a:rPr>
+            </a:br>
+            <a:endParaRPr lang="en-US" sz="1200" kern="1200" dirty="0">
+              <a:solidFill>
+                <a:schemeClr val="tx1"/>
+              </a:solidFill>
+              <a:effectLst/>
+              <a:latin typeface="+mn-lt"/>
+              <a:ea typeface="+mn-ea"/>
+              <a:cs typeface="+mn-cs"/>
+            </a:endParaRPr>
+          </a:p>
+          <a:p>
+            <a:endParaRPr lang="en-US" sz="1200" kern="1200" dirty="0">
+              <a:solidFill>
+                <a:schemeClr val="tx1"/>
+              </a:solidFill>
+              <a:effectLst/>
+              <a:latin typeface="+mn-lt"/>
+              <a:ea typeface="+mn-ea"/>
+              <a:cs typeface="+mn-cs"/>
+            </a:endParaRPr>
+          </a:p>
+          <a:p>
+            <a:endParaRPr lang="en-US" dirty="0"/>
+          </a:p>
+        </p:txBody>
+      </p:sp>
+      <p:sp>
+        <p:nvSpPr>
+          <p:cNvPr id="4" name="Slide Number Placeholder 3"/>
+          <p:cNvSpPr>
+            <a:spLocks noGrp="1"/>
+          </p:cNvSpPr>
+          <p:nvPr>
+            <p:ph type="sldNum" sz="quarter" idx="5"/>
+          </p:nvPr>
+        </p:nvSpPr>
+        <p:spPr/>
+        <p:txBody>
+          <a:bodyPr/>
+          <a:lstStyle/>
+          <a:p>
+            <a:fld id="{59BD4666-63B9-D545-9A4C-EE257FF4694B}" type="slidenum">
+              <a:rPr lang="en-US" smtClean="0"/>
+              <a:t>4</a:t>
+            </a:fld>
+            <a:endParaRPr lang="en-US"/>
+          </a:p>
+        </p:txBody>
+      </p:sp>
+    </p:spTree>
+    <p:extLst>
+      <p:ext uri="{BB962C8B-B14F-4D97-AF65-F5344CB8AC3E}">
+        <p14:creationId xmlns:p14="http://schemas.microsoft.com/office/powerpoint/2010/main" val="536876206"/>
+      </p:ext>
+    </p:extLst>
+  </p:cSld>
+  <p:clrMapOvr>
+    <a:masterClrMapping/>
+  </p:clrMapOvr>
+</p:notes>
+</file>
+
+<file path=ppt/notesSlides/notesSlide5.xml><?xml version="1.0" encoding="utf-8"?>
+<p:notes xmlns:a="http://schemas.openxmlformats.org/drawingml/2006/main" xmlns:r="http://schemas.openxmlformats.org/officeDocument/2006/relationships" xmlns:p="http://schemas.openxmlformats.org/presentationml/2006/main">
+  <p:cSld>
+    <p:spTree>
+      <p:nvGrpSpPr>
+        <p:cNvPr id="1" name=""/>
+        <p:cNvGrpSpPr/>
+        <p:nvPr/>
+      </p:nvGrpSpPr>
+      <p:grpSpPr>
+        <a:xfrm>
+          <a:off x="0" y="0"/>
+          <a:ext cx="0" cy="0"/>
+          <a:chOff x="0" y="0"/>
+          <a:chExt cx="0" cy="0"/>
+        </a:xfrm>
+      </p:grpSpPr>
+      <p:sp>
+        <p:nvSpPr>
+          <p:cNvPr id="2" name="Slide Image Placeholder 1"/>
+          <p:cNvSpPr>
+            <a:spLocks noGrp="1" noRot="1" noChangeAspect="1"/>
+          </p:cNvSpPr>
+          <p:nvPr>
+            <p:ph type="sldImg"/>
+          </p:nvPr>
+        </p:nvSpPr>
+        <p:spPr/>
+      </p:sp>
+      <p:sp>
+        <p:nvSpPr>
+          <p:cNvPr id="3" name="Notes Placeholder 2"/>
+          <p:cNvSpPr>
+            <a:spLocks noGrp="1"/>
+          </p:cNvSpPr>
+          <p:nvPr>
+            <p:ph type="body" idx="1"/>
+          </p:nvPr>
+        </p:nvSpPr>
+        <p:spPr/>
+        <p:txBody>
+          <a:bodyPr/>
+          <a:lstStyle/>
+          <a:p>
+            <a:r>
+              <a:rPr lang="en-US" sz="1200" kern="1200" dirty="0">
+                <a:solidFill>
+                  <a:schemeClr val="tx1"/>
+                </a:solidFill>
+                <a:effectLst/>
+                <a:latin typeface="+mn-lt"/>
+                <a:ea typeface="+mn-ea"/>
+                <a:cs typeface="+mn-cs"/>
+              </a:rPr>
+              <a:t>It is configurable for any offerings provided by Customer’s offerings or it can also be used by Mindbody make promotions in different areas e.g. </a:t>
+            </a:r>
+            <a:r>
+              <a:rPr lang="en-US" sz="1200" kern="1200" dirty="0" err="1">
+                <a:solidFill>
+                  <a:schemeClr val="tx1"/>
+                </a:solidFill>
+                <a:effectLst/>
+                <a:latin typeface="+mn-lt"/>
+                <a:ea typeface="+mn-ea"/>
+                <a:cs typeface="+mn-cs"/>
+              </a:rPr>
+              <a:t>Fitness,SPA</a:t>
+            </a:r>
+            <a:r>
+              <a:rPr lang="en-US" sz="1200" kern="1200" dirty="0">
+                <a:solidFill>
+                  <a:schemeClr val="tx1"/>
+                </a:solidFill>
+                <a:effectLst/>
+                <a:latin typeface="+mn-lt"/>
+                <a:ea typeface="+mn-ea"/>
+                <a:cs typeface="+mn-cs"/>
+              </a:rPr>
+              <a:t> and salons etc.</a:t>
+            </a:r>
+          </a:p>
+          <a:p>
+            <a:endParaRPr lang="en-US" sz="1200" kern="1200" dirty="0">
+              <a:solidFill>
+                <a:schemeClr val="tx1"/>
+              </a:solidFill>
+              <a:effectLst/>
+              <a:latin typeface="+mn-lt"/>
+              <a:ea typeface="+mn-ea"/>
+              <a:cs typeface="+mn-cs"/>
+            </a:endParaRPr>
+          </a:p>
+          <a:p>
+            <a:r>
+              <a:rPr lang="en-US" sz="1200" kern="1200" dirty="0">
+                <a:solidFill>
+                  <a:schemeClr val="tx1"/>
+                </a:solidFill>
+                <a:effectLst/>
+                <a:latin typeface="+mn-lt"/>
+                <a:ea typeface="+mn-ea"/>
+                <a:cs typeface="+mn-cs"/>
+              </a:rPr>
+              <a:t>Currently we have used </a:t>
+            </a:r>
+            <a:r>
+              <a:rPr lang="en-US" sz="1200" kern="1200" dirty="0" err="1">
+                <a:solidFill>
+                  <a:schemeClr val="tx1"/>
+                </a:solidFill>
+                <a:effectLst/>
+                <a:latin typeface="+mn-lt"/>
+                <a:ea typeface="+mn-ea"/>
+                <a:cs typeface="+mn-cs"/>
+              </a:rPr>
+              <a:t>ML.Net</a:t>
+            </a:r>
+            <a:r>
+              <a:rPr lang="en-US" sz="1200" kern="1200" dirty="0">
+                <a:solidFill>
+                  <a:schemeClr val="tx1"/>
+                </a:solidFill>
+                <a:effectLst/>
+                <a:latin typeface="+mn-lt"/>
+                <a:ea typeface="+mn-ea"/>
+                <a:cs typeface="+mn-cs"/>
+              </a:rPr>
+              <a:t> and we got our training and testing data from Twitter but we can get data from different sources. </a:t>
+            </a:r>
+          </a:p>
+          <a:p>
+            <a:endParaRPr lang="en-US" sz="1200" kern="1200" dirty="0">
+              <a:solidFill>
+                <a:schemeClr val="tx1"/>
+              </a:solidFill>
+              <a:effectLst/>
+              <a:latin typeface="+mn-lt"/>
+              <a:ea typeface="+mn-ea"/>
+              <a:cs typeface="+mn-cs"/>
+            </a:endParaRPr>
+          </a:p>
+          <a:p>
+            <a:r>
+              <a:rPr lang="en-US" sz="1200" kern="1200" dirty="0">
+                <a:solidFill>
+                  <a:schemeClr val="tx1"/>
+                </a:solidFill>
+                <a:effectLst/>
+                <a:latin typeface="+mn-lt"/>
+                <a:ea typeface="+mn-ea"/>
+                <a:cs typeface="+mn-cs"/>
+              </a:rPr>
+              <a:t>but it can also be achieved using other offerings provided by Python.</a:t>
+            </a:r>
+            <a:endParaRPr lang="en-US" dirty="0"/>
+          </a:p>
+        </p:txBody>
+      </p:sp>
+      <p:sp>
+        <p:nvSpPr>
+          <p:cNvPr id="4" name="Slide Number Placeholder 3"/>
+          <p:cNvSpPr>
+            <a:spLocks noGrp="1"/>
+          </p:cNvSpPr>
+          <p:nvPr>
+            <p:ph type="sldNum" sz="quarter" idx="5"/>
+          </p:nvPr>
+        </p:nvSpPr>
+        <p:spPr/>
+        <p:txBody>
+          <a:bodyPr/>
+          <a:lstStyle/>
+          <a:p>
+            <a:fld id="{59BD4666-63B9-D545-9A4C-EE257FF4694B}" type="slidenum">
+              <a:rPr lang="en-US" smtClean="0"/>
+              <a:t>5</a:t>
+            </a:fld>
+            <a:endParaRPr lang="en-US"/>
+          </a:p>
+        </p:txBody>
+      </p:sp>
+    </p:spTree>
+    <p:extLst>
+      <p:ext uri="{BB962C8B-B14F-4D97-AF65-F5344CB8AC3E}">
+        <p14:creationId xmlns:p14="http://schemas.microsoft.com/office/powerpoint/2010/main" val="2912012280"/>
       </p:ext>
     </p:extLst>
   </p:cSld>
@@ -11509,7 +11968,7 @@
                 <a:latin typeface="Avenir Next Ultra Light"/>
                 <a:cs typeface="Avenir Next Ultra Light"/>
               </a:rPr>
-              <a:t>12/11/2019</a:t>
+              <a:t>12/12/2019</a:t>
             </a:fld>
             <a:endParaRPr lang="en-US" dirty="0">
               <a:solidFill>
@@ -11606,7 +12065,7 @@
               <a:rPr lang="en-US" spc="53" dirty="0">
                 <a:latin typeface="Avenir Next Regular"/>
               </a:rPr>
-              <a:t>Our Idea</a:t>
+              <a:t>Problem Statement/Our Idea</a:t>
             </a:r>
             <a:endParaRPr lang="en-US" sz="2200" dirty="0"/>
           </a:p>
@@ -11635,24 +12094,47 @@
           </a:bodyPr>
           <a:lstStyle/>
           <a:p>
+            <a:pPr marL="0" indent="0">
+              <a:buNone/>
+            </a:pPr>
+            <a:r>
+              <a:rPr lang="en-US" b="1" u="sng" spc="53" dirty="0">
+                <a:latin typeface="Avenir Next Regular"/>
+              </a:rPr>
+              <a:t>Problem Statement</a:t>
+            </a:r>
+            <a:endParaRPr lang="en-US" b="1" u="sng" dirty="0"/>
+          </a:p>
+          <a:p>
             <a:r>
               <a:rPr lang="en-US" dirty="0"/>
-              <a:t>To implement an algorithm for automatic classification of text into positive or negative.</a:t>
+              <a:t>Identify customer opinions/pain points on different offerings provided by </a:t>
+            </a:r>
+            <a:r>
+              <a:rPr lang="en-US" dirty="0" err="1"/>
+              <a:t>MindBody</a:t>
+            </a:r>
+            <a:endParaRPr lang="en-US" dirty="0"/>
+          </a:p>
+          <a:p>
+            <a:pPr marL="0" indent="0">
+              <a:buNone/>
+            </a:pPr>
+            <a:endParaRPr lang="en-US" dirty="0"/>
+          </a:p>
+          <a:p>
+            <a:pPr marL="0" indent="0">
+              <a:buNone/>
+            </a:pPr>
+            <a:r>
+              <a:rPr lang="en-US" b="1" u="sng" dirty="0"/>
+              <a:t>Our Idea</a:t>
             </a:r>
           </a:p>
           <a:p>
             <a:r>
               <a:rPr lang="en-US" dirty="0"/>
-              <a:t>Graphical representation of the sentiment in the form of some chart</a:t>
-            </a:r>
-          </a:p>
-          <a:p>
-            <a:pPr marL="0" indent="0">
-              <a:buNone/>
-            </a:pPr>
-            <a:r>
-              <a:rPr lang="en-US" dirty="0"/>
-              <a:t>The good, the bad, the OMG!!</a:t>
+              <a:t>We introduce an approach for automatically classifying the sentiment of customer reviews. These reviews may come from Twitter, google, Yelp messages or single line comment. These messages are classified as either positive or negative.</a:t>
             </a:r>
           </a:p>
         </p:txBody>
@@ -12856,7 +13338,7 @@
           <p:cNvPr id="2" name="Title 1">
             <a:extLst>
               <a:ext uri="{FF2B5EF4-FFF2-40B4-BE49-F238E27FC236}">
-                <a16:creationId xmlns:a16="http://schemas.microsoft.com/office/drawing/2014/main" id="{C768DE5B-CF0A-429C-AAC6-12CC247F3B50}"/>
+                <a16:creationId xmlns:a16="http://schemas.microsoft.com/office/drawing/2014/main" id="{BB4B68E6-AD42-48F1-A7A8-9EB8FDAA3902}"/>
               </a:ext>
             </a:extLst>
           </p:cNvPr>
@@ -12874,7 +13356,7 @@
           <a:p>
             <a:r>
               <a:rPr lang="en-US" dirty="0"/>
-              <a:t>Technology used</a:t>
+              <a:t>Business value</a:t>
             </a:r>
           </a:p>
         </p:txBody>
@@ -12884,7 +13366,7 @@
           <p:cNvPr id="3" name="Content Placeholder 2">
             <a:extLst>
               <a:ext uri="{FF2B5EF4-FFF2-40B4-BE49-F238E27FC236}">
-                <a16:creationId xmlns:a16="http://schemas.microsoft.com/office/drawing/2014/main" id="{F93ECF70-BFF3-4453-A202-ADDC49453E0E}"/>
+                <a16:creationId xmlns:a16="http://schemas.microsoft.com/office/drawing/2014/main" id="{121A4719-D5AC-4F5A-808E-9F17FB6F911A}"/>
               </a:ext>
             </a:extLst>
           </p:cNvPr>
@@ -12897,42 +13379,36 @@
         </p:nvSpPr>
         <p:spPr/>
         <p:txBody>
-          <a:bodyPr>
+          <a:bodyPr vert="horz" lIns="91440" tIns="45720" rIns="91440" bIns="45720" rtlCol="0" anchor="t">
             <a:normAutofit/>
           </a:bodyPr>
           <a:lstStyle/>
           <a:p>
-            <a:r>
-              <a:rPr lang="en-US" dirty="0" err="1"/>
-              <a:t>ML.Net,Web</a:t>
-            </a:r>
+            <a:pPr lvl="0" fontAlgn="base"/>
             <a:r>
               <a:rPr lang="en-US" dirty="0"/>
-              <a:t> API</a:t>
-            </a:r>
-          </a:p>
-          <a:p>
+              <a:t>Improve customer experience</a:t>
+            </a:r>
+          </a:p>
+          <a:p>
+            <a:pPr lvl="0" fontAlgn="base"/>
             <a:r>
               <a:rPr lang="en-US" dirty="0"/>
-              <a:t>Google </a:t>
-            </a:r>
-            <a:r>
-              <a:rPr lang="en-US" dirty="0" err="1"/>
-              <a:t>API,Twitter</a:t>
-            </a:r>
+              <a:t>Determine future marketing strategies</a:t>
+            </a:r>
+          </a:p>
+          <a:p>
+            <a:pPr lvl="0" fontAlgn="base"/>
             <a:r>
               <a:rPr lang="en-US" dirty="0"/>
-              <a:t> API, Yelp API</a:t>
-            </a:r>
-          </a:p>
-          <a:p>
-            <a:r>
-              <a:rPr lang="en-US" dirty="0" err="1"/>
-              <a:t>HTML,Bootstrap</a:t>
-            </a:r>
+              <a:t>Improve marketing campaigns and product messaging</a:t>
+            </a:r>
+          </a:p>
+          <a:p>
             <a:endParaRPr lang="en-US" dirty="0"/>
           </a:p>
           <a:p>
+            <a:pPr marL="170815" indent="-170815"/>
             <a:endParaRPr lang="en-US" dirty="0"/>
           </a:p>
         </p:txBody>
@@ -12942,7 +13418,7 @@
           <p:cNvPr id="4" name="Slide Number Placeholder 3">
             <a:extLst>
               <a:ext uri="{FF2B5EF4-FFF2-40B4-BE49-F238E27FC236}">
-                <a16:creationId xmlns:a16="http://schemas.microsoft.com/office/drawing/2014/main" id="{1ECED321-CEB7-4A75-B558-6BF68E342413}"/>
+                <a16:creationId xmlns:a16="http://schemas.microsoft.com/office/drawing/2014/main" id="{D1094019-BA62-4695-9708-5B5C7459160E}"/>
               </a:ext>
             </a:extLst>
           </p:cNvPr>
@@ -12969,7 +13445,7 @@
     </p:spTree>
     <p:extLst>
       <p:ext uri="{BB962C8B-B14F-4D97-AF65-F5344CB8AC3E}">
-        <p14:creationId xmlns:p14="http://schemas.microsoft.com/office/powerpoint/2010/main" val="685822531"/>
+        <p14:creationId xmlns:p14="http://schemas.microsoft.com/office/powerpoint/2010/main" val="1364277664"/>
       </p:ext>
     </p:extLst>
   </p:cSld>
@@ -13019,7 +13495,7 @@
           <a:p>
             <a:r>
               <a:rPr lang="en-US" dirty="0"/>
-              <a:t>Business value</a:t>
+              <a:t>What next</a:t>
             </a:r>
           </a:p>
         </p:txBody>
@@ -13049,25 +13525,33 @@
           <a:p>
             <a:r>
               <a:rPr lang="en-US" dirty="0"/>
-              <a:t>Product/Services reviews</a:t>
+              <a:t>We can try different algorithms to get more accurate predictions</a:t>
             </a:r>
           </a:p>
           <a:p>
             <a:r>
               <a:rPr lang="en-US" dirty="0"/>
-              <a:t>Location reviews</a:t>
-            </a:r>
-          </a:p>
-          <a:p>
+              <a:t>Currently we have used </a:t>
+            </a:r>
+            <a:r>
+              <a:rPr lang="en-US" dirty="0" err="1"/>
+              <a:t>ML.Net</a:t>
+            </a:r>
             <a:r>
               <a:rPr lang="en-US" dirty="0"/>
-              <a:t>Reviews on different Business Units</a:t>
+              <a:t> but it can also be achieved using other offerings provided by Python</a:t>
             </a:r>
           </a:p>
           <a:p>
             <a:r>
               <a:rPr lang="en-US" dirty="0"/>
-              <a:t>Analyze consumer attitudes, trends in different locations and remain competitive</a:t>
+              <a:t>Twitter reviews are used for POC. Reviews may come from different sources</a:t>
+            </a:r>
+          </a:p>
+          <a:p>
+            <a:r>
+              <a:rPr lang="en-US" dirty="0"/>
+              <a:t>Data accuracy can also be improved by providing better test data</a:t>
             </a:r>
           </a:p>
           <a:p>
@@ -13100,127 +13584,6 @@
             <a:fld id="{82AEA107-C900-3B4B-8F0F-72A19A6B70A9}" type="slidenum">
               <a:rPr lang="en-US" smtClean="0"/>
               <a:t>5</a:t>
-            </a:fld>
-            <a:endParaRPr lang="en-US"/>
-          </a:p>
-        </p:txBody>
-      </p:sp>
-    </p:spTree>
-    <p:extLst>
-      <p:ext uri="{BB962C8B-B14F-4D97-AF65-F5344CB8AC3E}">
-        <p14:creationId xmlns:p14="http://schemas.microsoft.com/office/powerpoint/2010/main" val="1364277664"/>
-      </p:ext>
-    </p:extLst>
-  </p:cSld>
-  <p:clrMapOvr>
-    <a:masterClrMapping/>
-  </p:clrMapOvr>
-</p:sld>
-</file>
-
-<file path=ppt/slides/slide6.xml><?xml version="1.0" encoding="utf-8"?>
-<p:sld xmlns:a="http://schemas.openxmlformats.org/drawingml/2006/main" xmlns:r="http://schemas.openxmlformats.org/officeDocument/2006/relationships" xmlns:p="http://schemas.openxmlformats.org/presentationml/2006/main">
-  <p:cSld>
-    <p:spTree>
-      <p:nvGrpSpPr>
-        <p:cNvPr id="1" name=""/>
-        <p:cNvGrpSpPr/>
-        <p:nvPr/>
-      </p:nvGrpSpPr>
-      <p:grpSpPr>
-        <a:xfrm>
-          <a:off x="0" y="0"/>
-          <a:ext cx="0" cy="0"/>
-          <a:chOff x="0" y="0"/>
-          <a:chExt cx="0" cy="0"/>
-        </a:xfrm>
-      </p:grpSpPr>
-      <p:sp>
-        <p:nvSpPr>
-          <p:cNvPr id="2" name="Title 1">
-            <a:extLst>
-              <a:ext uri="{FF2B5EF4-FFF2-40B4-BE49-F238E27FC236}">
-                <a16:creationId xmlns:a16="http://schemas.microsoft.com/office/drawing/2014/main" id="{BB4B68E6-AD42-48F1-A7A8-9EB8FDAA3902}"/>
-              </a:ext>
-            </a:extLst>
-          </p:cNvPr>
-          <p:cNvSpPr>
-            <a:spLocks noGrp="1"/>
-          </p:cNvSpPr>
-          <p:nvPr>
-            <p:ph type="title"/>
-          </p:nvPr>
-        </p:nvSpPr>
-        <p:spPr/>
-        <p:txBody>
-          <a:bodyPr/>
-          <a:lstStyle/>
-          <a:p>
-            <a:r>
-              <a:rPr lang="en-US" dirty="0"/>
-              <a:t>What next</a:t>
-            </a:r>
-          </a:p>
-        </p:txBody>
-      </p:sp>
-      <p:sp>
-        <p:nvSpPr>
-          <p:cNvPr id="3" name="Content Placeholder 2">
-            <a:extLst>
-              <a:ext uri="{FF2B5EF4-FFF2-40B4-BE49-F238E27FC236}">
-                <a16:creationId xmlns:a16="http://schemas.microsoft.com/office/drawing/2014/main" id="{121A4719-D5AC-4F5A-808E-9F17FB6F911A}"/>
-              </a:ext>
-            </a:extLst>
-          </p:cNvPr>
-          <p:cNvSpPr>
-            <a:spLocks noGrp="1"/>
-          </p:cNvSpPr>
-          <p:nvPr>
-            <p:ph idx="1"/>
-          </p:nvPr>
-        </p:nvSpPr>
-        <p:spPr/>
-        <p:txBody>
-          <a:bodyPr vert="horz" lIns="91440" tIns="45720" rIns="91440" bIns="45720" rtlCol="0" anchor="t">
-            <a:normAutofit/>
-          </a:bodyPr>
-          <a:lstStyle/>
-          <a:p>
-            <a:r>
-              <a:rPr lang="en-US" dirty="0"/>
-              <a:t>We can try different algorithms to add more business values</a:t>
-            </a:r>
-          </a:p>
-          <a:p>
-            <a:pPr marL="170815" indent="-170815"/>
-            <a:endParaRPr lang="en-US" dirty="0"/>
-          </a:p>
-        </p:txBody>
-      </p:sp>
-      <p:sp>
-        <p:nvSpPr>
-          <p:cNvPr id="4" name="Slide Number Placeholder 3">
-            <a:extLst>
-              <a:ext uri="{FF2B5EF4-FFF2-40B4-BE49-F238E27FC236}">
-                <a16:creationId xmlns:a16="http://schemas.microsoft.com/office/drawing/2014/main" id="{D1094019-BA62-4695-9708-5B5C7459160E}"/>
-              </a:ext>
-            </a:extLst>
-          </p:cNvPr>
-          <p:cNvSpPr>
-            <a:spLocks noGrp="1"/>
-          </p:cNvSpPr>
-          <p:nvPr>
-            <p:ph type="sldNum" sz="quarter" idx="12"/>
-          </p:nvPr>
-        </p:nvSpPr>
-        <p:spPr/>
-        <p:txBody>
-          <a:bodyPr/>
-          <a:lstStyle/>
-          <a:p>
-            <a:fld id="{82AEA107-C900-3B4B-8F0F-72A19A6B70A9}" type="slidenum">
-              <a:rPr lang="en-US" smtClean="0"/>
-              <a:t>6</a:t>
             </a:fld>
             <a:endParaRPr lang="en-US"/>
           </a:p>
@@ -13239,7 +13602,7 @@
 </p:sld>
 </file>
 
-<file path=ppt/slides/slide7.xml><?xml version="1.0" encoding="utf-8"?>
+<file path=ppt/slides/slide6.xml><?xml version="1.0" encoding="utf-8"?>
 <p:sld xmlns:a="http://schemas.openxmlformats.org/drawingml/2006/main" xmlns:r="http://schemas.openxmlformats.org/officeDocument/2006/relationships" xmlns:p="http://schemas.openxmlformats.org/presentationml/2006/main">
   <p:cSld>
     <p:spTree>
@@ -13856,21 +14219,6 @@
 </file>
 
 <file path=customXml/item1.xml><?xml version="1.0" encoding="utf-8"?>
-<?mso-contentType ?>
-<FormTemplates xmlns="http://schemas.microsoft.com/sharepoint/v3/contenttype/forms">
-  <Display>DocumentLibraryForm</Display>
-  <Edit>DocumentLibraryForm</Edit>
-  <New>DocumentLibraryForm</New>
-</FormTemplates>
-</file>
-
-<file path=customXml/item2.xml><?xml version="1.0" encoding="utf-8"?>
-<p:properties xmlns:p="http://schemas.microsoft.com/office/2006/metadata/properties" xmlns:xsi="http://www.w3.org/2001/XMLSchema-instance" xmlns:pc="http://schemas.microsoft.com/office/infopath/2007/PartnerControls">
-  <documentManagement/>
-</p:properties>
-</file>
-
-<file path=customXml/item3.xml><?xml version="1.0" encoding="utf-8"?>
 <ct:contentTypeSchema xmlns:ct="http://schemas.microsoft.com/office/2006/metadata/contentType" xmlns:ma="http://schemas.microsoft.com/office/2006/metadata/properties/metaAttributes" ct:_="" ma:_="" ma:contentTypeName="Document" ma:contentTypeID="0x0101008FDE80407D6F394FBF0AE466E4A0DAFB" ma:contentTypeVersion="4" ma:contentTypeDescription="Create a new document." ma:contentTypeScope="" ma:versionID="61d01ef4944ecd915501b2eb45ca1484">
   <xsd:schema xmlns:xsd="http://www.w3.org/2001/XMLSchema" xmlns:xs="http://www.w3.org/2001/XMLSchema" xmlns:p="http://schemas.microsoft.com/office/2006/metadata/properties" xmlns:ns2="4d2cd3c0-2c96-4089-8025-40a4f8fed35c" xmlns:ns3="5ebbaec0-0e71-40b9-a37f-36be39db429c" targetNamespace="http://schemas.microsoft.com/office/2006/metadata/properties" ma:root="true" ma:fieldsID="d95c189d0d130f13bfc32339ad6c8651" ns2:_="" ns3:_="">
     <xsd:import namespace="4d2cd3c0-2c96-4089-8025-40a4f8fed35c"/>
@@ -14035,10 +14383,36 @@
 </ct:contentTypeSchema>
 </file>
 
+<file path=customXml/item2.xml><?xml version="1.0" encoding="utf-8"?>
+<p:properties xmlns:p="http://schemas.microsoft.com/office/2006/metadata/properties" xmlns:xsi="http://www.w3.org/2001/XMLSchema-instance" xmlns:pc="http://schemas.microsoft.com/office/infopath/2007/PartnerControls">
+  <documentManagement/>
+</p:properties>
+</file>
+
+<file path=customXml/item3.xml><?xml version="1.0" encoding="utf-8"?>
+<?mso-contentType ?>
+<FormTemplates xmlns="http://schemas.microsoft.com/sharepoint/v3/contenttype/forms">
+  <Display>DocumentLibraryForm</Display>
+  <Edit>DocumentLibraryForm</Edit>
+  <New>DocumentLibraryForm</New>
+</FormTemplates>
+</file>
+
 <file path=customXml/itemProps1.xml><?xml version="1.0" encoding="utf-8"?>
-<ds:datastoreItem xmlns:ds="http://schemas.openxmlformats.org/officeDocument/2006/customXml" ds:itemID="{79EBE94C-290C-435C-99BA-BBC0E8BB5EFA}">
+<ds:datastoreItem xmlns:ds="http://schemas.openxmlformats.org/officeDocument/2006/customXml" ds:itemID="{B526E34D-0337-419F-BD45-5BB384D04CA9}">
   <ds:schemaRefs>
-    <ds:schemaRef ds:uri="http://schemas.microsoft.com/sharepoint/v3/contenttype/forms"/>
+    <ds:schemaRef ds:uri="http://schemas.microsoft.com/office/2006/metadata/contentType"/>
+    <ds:schemaRef ds:uri="http://schemas.microsoft.com/office/2006/metadata/properties/metaAttributes"/>
+    <ds:schemaRef ds:uri="http://www.w3.org/2001/XMLSchema"/>
+    <ds:schemaRef ds:uri="http://schemas.microsoft.com/office/2006/metadata/properties"/>
+    <ds:schemaRef ds:uri="4d2cd3c0-2c96-4089-8025-40a4f8fed35c"/>
+    <ds:schemaRef ds:uri="5ebbaec0-0e71-40b9-a37f-36be39db429c"/>
+    <ds:schemaRef ds:uri="http://schemas.microsoft.com/office/2006/documentManagement/types"/>
+    <ds:schemaRef ds:uri="http://schemas.microsoft.com/office/infopath/2007/PartnerControls"/>
+    <ds:schemaRef ds:uri="http://schemas.openxmlformats.org/package/2006/metadata/core-properties"/>
+    <ds:schemaRef ds:uri="http://purl.org/dc/elements/1.1/"/>
+    <ds:schemaRef ds:uri="http://purl.org/dc/terms/"/>
+    <ds:schemaRef ds:uri="http://schemas.microsoft.com/internal/obd"/>
   </ds:schemaRefs>
 </ds:datastoreItem>
 </file>
@@ -14061,20 +14435,9 @@
 </file>
 
 <file path=customXml/itemProps3.xml><?xml version="1.0" encoding="utf-8"?>
-<ds:datastoreItem xmlns:ds="http://schemas.openxmlformats.org/officeDocument/2006/customXml" ds:itemID="{B526E34D-0337-419F-BD45-5BB384D04CA9}">
+<ds:datastoreItem xmlns:ds="http://schemas.openxmlformats.org/officeDocument/2006/customXml" ds:itemID="{79EBE94C-290C-435C-99BA-BBC0E8BB5EFA}">
   <ds:schemaRefs>
-    <ds:schemaRef ds:uri="http://schemas.microsoft.com/office/2006/metadata/contentType"/>
-    <ds:schemaRef ds:uri="http://schemas.microsoft.com/office/2006/metadata/properties/metaAttributes"/>
-    <ds:schemaRef ds:uri="http://www.w3.org/2001/XMLSchema"/>
-    <ds:schemaRef ds:uri="http://schemas.microsoft.com/office/2006/metadata/properties"/>
-    <ds:schemaRef ds:uri="4d2cd3c0-2c96-4089-8025-40a4f8fed35c"/>
-    <ds:schemaRef ds:uri="5ebbaec0-0e71-40b9-a37f-36be39db429c"/>
-    <ds:schemaRef ds:uri="http://schemas.microsoft.com/office/2006/documentManagement/types"/>
-    <ds:schemaRef ds:uri="http://schemas.microsoft.com/office/infopath/2007/PartnerControls"/>
-    <ds:schemaRef ds:uri="http://schemas.openxmlformats.org/package/2006/metadata/core-properties"/>
-    <ds:schemaRef ds:uri="http://purl.org/dc/elements/1.1/"/>
-    <ds:schemaRef ds:uri="http://purl.org/dc/terms/"/>
-    <ds:schemaRef ds:uri="http://schemas.microsoft.com/internal/obd"/>
+    <ds:schemaRef ds:uri="http://schemas.microsoft.com/sharepoint/v3/contenttype/forms"/>
   </ds:schemaRefs>
 </ds:datastoreItem>
 </file>
</xml_diff>